<commit_message>
updating architecture diagram in documentation
</commit_message>
<xml_diff>
--- a/doc/sds.pptx
+++ b/doc/sds.pptx
@@ -104,6 +104,11 @@
       </a:defRPr>
     </a:lvl9pPr>
   </p:defaultTextStyle>
+  <p:extLst>
+    <p:ext uri="{EFAFB233-063F-42B5-8137-9DF3F51BA10A}">
+      <p15:sldGuideLst xmlns:p15="http://schemas.microsoft.com/office/powerpoint/2012/main"/>
+    </p:ext>
+  </p:extLst>
 </p:presentation>
 </file>
 
@@ -256,7 +261,7 @@
           <a:p>
             <a:fld id="{35FBE36E-D8D8-CA40-B430-27A9DEE34B48}" type="datetimeFigureOut">
               <a:rPr lang="en-US" smtClean="0"/>
-              <a:t>6/22/22</a:t>
+              <a:t>9/1/22</a:t>
             </a:fld>
             <a:endParaRPr lang="en-US"/>
           </a:p>
@@ -456,7 +461,7 @@
           <a:p>
             <a:fld id="{35FBE36E-D8D8-CA40-B430-27A9DEE34B48}" type="datetimeFigureOut">
               <a:rPr lang="en-US" smtClean="0"/>
-              <a:t>6/22/22</a:t>
+              <a:t>9/1/22</a:t>
             </a:fld>
             <a:endParaRPr lang="en-US"/>
           </a:p>
@@ -666,7 +671,7 @@
           <a:p>
             <a:fld id="{35FBE36E-D8D8-CA40-B430-27A9DEE34B48}" type="datetimeFigureOut">
               <a:rPr lang="en-US" smtClean="0"/>
-              <a:t>6/22/22</a:t>
+              <a:t>9/1/22</a:t>
             </a:fld>
             <a:endParaRPr lang="en-US"/>
           </a:p>
@@ -866,7 +871,7 @@
           <a:p>
             <a:fld id="{35FBE36E-D8D8-CA40-B430-27A9DEE34B48}" type="datetimeFigureOut">
               <a:rPr lang="en-US" smtClean="0"/>
-              <a:t>6/22/22</a:t>
+              <a:t>9/1/22</a:t>
             </a:fld>
             <a:endParaRPr lang="en-US"/>
           </a:p>
@@ -1142,7 +1147,7 @@
           <a:p>
             <a:fld id="{35FBE36E-D8D8-CA40-B430-27A9DEE34B48}" type="datetimeFigureOut">
               <a:rPr lang="en-US" smtClean="0"/>
-              <a:t>6/22/22</a:t>
+              <a:t>9/1/22</a:t>
             </a:fld>
             <a:endParaRPr lang="en-US"/>
           </a:p>
@@ -1410,7 +1415,7 @@
           <a:p>
             <a:fld id="{35FBE36E-D8D8-CA40-B430-27A9DEE34B48}" type="datetimeFigureOut">
               <a:rPr lang="en-US" smtClean="0"/>
-              <a:t>6/22/22</a:t>
+              <a:t>9/1/22</a:t>
             </a:fld>
             <a:endParaRPr lang="en-US"/>
           </a:p>
@@ -1825,7 +1830,7 @@
           <a:p>
             <a:fld id="{35FBE36E-D8D8-CA40-B430-27A9DEE34B48}" type="datetimeFigureOut">
               <a:rPr lang="en-US" smtClean="0"/>
-              <a:t>6/22/22</a:t>
+              <a:t>9/1/22</a:t>
             </a:fld>
             <a:endParaRPr lang="en-US"/>
           </a:p>
@@ -1967,7 +1972,7 @@
           <a:p>
             <a:fld id="{35FBE36E-D8D8-CA40-B430-27A9DEE34B48}" type="datetimeFigureOut">
               <a:rPr lang="en-US" smtClean="0"/>
-              <a:t>6/22/22</a:t>
+              <a:t>9/1/22</a:t>
             </a:fld>
             <a:endParaRPr lang="en-US"/>
           </a:p>
@@ -2080,7 +2085,7 @@
           <a:p>
             <a:fld id="{35FBE36E-D8D8-CA40-B430-27A9DEE34B48}" type="datetimeFigureOut">
               <a:rPr lang="en-US" smtClean="0"/>
-              <a:t>6/22/22</a:t>
+              <a:t>9/1/22</a:t>
             </a:fld>
             <a:endParaRPr lang="en-US"/>
           </a:p>
@@ -2393,7 +2398,7 @@
           <a:p>
             <a:fld id="{35FBE36E-D8D8-CA40-B430-27A9DEE34B48}" type="datetimeFigureOut">
               <a:rPr lang="en-US" smtClean="0"/>
-              <a:t>6/22/22</a:t>
+              <a:t>9/1/22</a:t>
             </a:fld>
             <a:endParaRPr lang="en-US"/>
           </a:p>
@@ -2682,7 +2687,7 @@
           <a:p>
             <a:fld id="{35FBE36E-D8D8-CA40-B430-27A9DEE34B48}" type="datetimeFigureOut">
               <a:rPr lang="en-US" smtClean="0"/>
-              <a:t>6/22/22</a:t>
+              <a:t>9/1/22</a:t>
             </a:fld>
             <a:endParaRPr lang="en-US"/>
           </a:p>
@@ -2925,7 +2930,7 @@
           <a:p>
             <a:fld id="{35FBE36E-D8D8-CA40-B430-27A9DEE34B48}" type="datetimeFigureOut">
               <a:rPr lang="en-US" smtClean="0"/>
-              <a:t>6/22/22</a:t>
+              <a:t>9/1/22</a:t>
             </a:fld>
             <a:endParaRPr lang="en-US"/>
           </a:p>
@@ -3342,12 +3347,55 @@
           <a:chExt cx="0" cy="0"/>
         </a:xfrm>
       </p:grpSpPr>
-      <p:sp>
-        <p:nvSpPr>
-          <p:cNvPr id="6" name="Rectangle 5">
-            <a:extLst>
-              <a:ext uri="{FF2B5EF4-FFF2-40B4-BE49-F238E27FC236}">
-                <a16:creationId xmlns:a16="http://schemas.microsoft.com/office/drawing/2014/main" id="{AA4F434A-3DA6-BC80-36CF-43ED8F5AB548}"/>
+      <p:cxnSp>
+        <p:nvCxnSpPr>
+          <p:cNvPr id="123" name="Straight Connector 122">
+            <a:extLst>
+              <a:ext uri="{FF2B5EF4-FFF2-40B4-BE49-F238E27FC236}">
+                <a16:creationId xmlns:a16="http://schemas.microsoft.com/office/drawing/2014/main" id="{1995F98B-66BA-E685-FC38-B9FF4CAA51AB}"/>
+              </a:ext>
+            </a:extLst>
+          </p:cNvPr>
+          <p:cNvCxnSpPr>
+            <a:cxnSpLocks/>
+          </p:cNvCxnSpPr>
+          <p:nvPr/>
+        </p:nvCxnSpPr>
+        <p:spPr>
+          <a:xfrm>
+            <a:off x="600066" y="2027874"/>
+            <a:ext cx="10721946" cy="0"/>
+          </a:xfrm>
+          <a:prstGeom prst="line">
+            <a:avLst/>
+          </a:prstGeom>
+          <a:ln w="38100">
+            <a:solidFill>
+              <a:srgbClr val="97BCCA"/>
+            </a:solidFill>
+          </a:ln>
+        </p:spPr>
+        <p:style>
+          <a:lnRef idx="1">
+            <a:schemeClr val="accent1"/>
+          </a:lnRef>
+          <a:fillRef idx="0">
+            <a:schemeClr val="accent1"/>
+          </a:fillRef>
+          <a:effectRef idx="0">
+            <a:schemeClr val="accent1"/>
+          </a:effectRef>
+          <a:fontRef idx="minor">
+            <a:schemeClr val="tx1"/>
+          </a:fontRef>
+        </p:style>
+      </p:cxnSp>
+      <p:sp>
+        <p:nvSpPr>
+          <p:cNvPr id="7" name="Can 6">
+            <a:extLst>
+              <a:ext uri="{FF2B5EF4-FFF2-40B4-BE49-F238E27FC236}">
+                <a16:creationId xmlns:a16="http://schemas.microsoft.com/office/drawing/2014/main" id="{449D2A16-258F-D50E-1916-BE797C0ECFA7}"/>
               </a:ext>
             </a:extLst>
           </p:cNvPr>
@@ -3356,8 +3404,80 @@
         </p:nvSpPr>
         <p:spPr>
           <a:xfrm>
-            <a:off x="3093563" y="1536528"/>
-            <a:ext cx="6791675" cy="3784944"/>
+            <a:off x="6155939" y="4111238"/>
+            <a:ext cx="1465169" cy="1219788"/>
+          </a:xfrm>
+          <a:prstGeom prst="can">
+            <a:avLst/>
+          </a:prstGeom>
+          <a:solidFill>
+            <a:srgbClr val="1D5366"/>
+          </a:solidFill>
+          <a:ln w="19050">
+            <a:solidFill>
+              <a:srgbClr val="329BCA"/>
+            </a:solidFill>
+          </a:ln>
+        </p:spPr>
+        <p:style>
+          <a:lnRef idx="2">
+            <a:schemeClr val="accent1">
+              <a:shade val="50000"/>
+            </a:schemeClr>
+          </a:lnRef>
+          <a:fillRef idx="1">
+            <a:schemeClr val="accent1"/>
+          </a:fillRef>
+          <a:effectRef idx="0">
+            <a:schemeClr val="accent1"/>
+          </a:effectRef>
+          <a:fontRef idx="minor">
+            <a:schemeClr val="lt1"/>
+          </a:fontRef>
+        </p:style>
+        <p:txBody>
+          <a:bodyPr rtlCol="0" anchor="ctr"/>
+          <a:lstStyle/>
+          <a:p>
+            <a:pPr algn="ctr"/>
+            <a:r>
+              <a:rPr lang="en-US" sz="1600" dirty="0"/>
+              <a:t>DB</a:t>
+            </a:r>
+          </a:p>
+          <a:p>
+            <a:pPr algn="ctr"/>
+            <a:r>
+              <a:rPr lang="en-US" sz="1600" dirty="0"/>
+              <a:t>(</a:t>
+            </a:r>
+            <a:r>
+              <a:rPr lang="en-US" sz="1600" dirty="0" err="1"/>
+              <a:t>elasticsearch</a:t>
+            </a:r>
+            <a:r>
+              <a:rPr lang="en-US" sz="1600" dirty="0"/>
+              <a:t>)</a:t>
+            </a:r>
+          </a:p>
+        </p:txBody>
+      </p:sp>
+      <p:sp>
+        <p:nvSpPr>
+          <p:cNvPr id="29" name="Rectangle 28">
+            <a:extLst>
+              <a:ext uri="{FF2B5EF4-FFF2-40B4-BE49-F238E27FC236}">
+                <a16:creationId xmlns:a16="http://schemas.microsoft.com/office/drawing/2014/main" id="{F40C3199-66D6-7AB2-E682-59158549655A}"/>
+              </a:ext>
+            </a:extLst>
+          </p:cNvPr>
+          <p:cNvSpPr/>
+          <p:nvPr/>
+        </p:nvSpPr>
+        <p:spPr>
+          <a:xfrm>
+            <a:off x="6851019" y="440607"/>
+            <a:ext cx="1270223" cy="848960"/>
           </a:xfrm>
           <a:prstGeom prst="rect">
             <a:avLst/>
@@ -3388,27 +3508,23 @@
           </a:fontRef>
         </p:style>
         <p:txBody>
-          <a:bodyPr rtlCol="0" anchor="t" anchorCtr="0"/>
+          <a:bodyPr rtlCol="0" anchor="ctr"/>
           <a:lstStyle/>
           <a:p>
             <a:pPr algn="ctr"/>
-            <a:endParaRPr lang="en-US" sz="1600" dirty="0"/>
-          </a:p>
-          <a:p>
-            <a:pPr algn="ctr"/>
-            <a:r>
-              <a:rPr lang="en-US" dirty="0"/>
-              <a:t>SDS services</a:t>
-            </a:r>
-          </a:p>
-        </p:txBody>
-      </p:sp>
-      <p:sp>
-        <p:nvSpPr>
-          <p:cNvPr id="8" name="Can 7">
-            <a:extLst>
-              <a:ext uri="{FF2B5EF4-FFF2-40B4-BE49-F238E27FC236}">
-                <a16:creationId xmlns:a16="http://schemas.microsoft.com/office/drawing/2014/main" id="{F4F4BE85-192B-0462-C82C-B1E3CE445701}"/>
+            <a:r>
+              <a:rPr lang="en-US" sz="1600" dirty="0"/>
+              <a:t>SDS client 1</a:t>
+            </a:r>
+          </a:p>
+        </p:txBody>
+      </p:sp>
+      <p:sp>
+        <p:nvSpPr>
+          <p:cNvPr id="30" name="Rectangle 29">
+            <a:extLst>
+              <a:ext uri="{FF2B5EF4-FFF2-40B4-BE49-F238E27FC236}">
+                <a16:creationId xmlns:a16="http://schemas.microsoft.com/office/drawing/2014/main" id="{5BFED5FD-008C-7D28-33A0-C066DF9EA662}"/>
               </a:ext>
             </a:extLst>
           </p:cNvPr>
@@ -3417,356 +3533,7 @@
         </p:nvSpPr>
         <p:spPr>
           <a:xfrm>
-            <a:off x="6030779" y="3765995"/>
-            <a:ext cx="919705" cy="906441"/>
-          </a:xfrm>
-          <a:prstGeom prst="can">
-            <a:avLst/>
-          </a:prstGeom>
-          <a:solidFill>
-            <a:srgbClr val="1D5366"/>
-          </a:solidFill>
-          <a:ln w="19050">
-            <a:solidFill>
-              <a:srgbClr val="329BCA"/>
-            </a:solidFill>
-          </a:ln>
-        </p:spPr>
-        <p:style>
-          <a:lnRef idx="2">
-            <a:schemeClr val="accent1">
-              <a:shade val="50000"/>
-            </a:schemeClr>
-          </a:lnRef>
-          <a:fillRef idx="1">
-            <a:schemeClr val="accent1"/>
-          </a:fillRef>
-          <a:effectRef idx="0">
-            <a:schemeClr val="accent1"/>
-          </a:effectRef>
-          <a:fontRef idx="minor">
-            <a:schemeClr val="lt1"/>
-          </a:fontRef>
-        </p:style>
-        <p:txBody>
-          <a:bodyPr rtlCol="0" anchor="ctr"/>
-          <a:lstStyle/>
-          <a:p>
-            <a:pPr algn="ctr"/>
-            <a:r>
-              <a:rPr lang="en-US" sz="1600" dirty="0"/>
-              <a:t>Storage</a:t>
-            </a:r>
-          </a:p>
-        </p:txBody>
-      </p:sp>
-      <p:sp>
-        <p:nvSpPr>
-          <p:cNvPr id="9" name="Rectangle 8">
-            <a:extLst>
-              <a:ext uri="{FF2B5EF4-FFF2-40B4-BE49-F238E27FC236}">
-                <a16:creationId xmlns:a16="http://schemas.microsoft.com/office/drawing/2014/main" id="{D9AD703A-2204-0211-3F9C-11FB25292466}"/>
-              </a:ext>
-            </a:extLst>
-          </p:cNvPr>
-          <p:cNvSpPr/>
-          <p:nvPr/>
-        </p:nvSpPr>
-        <p:spPr>
-          <a:xfrm>
-            <a:off x="3402919" y="2268315"/>
-            <a:ext cx="1270223" cy="771782"/>
-          </a:xfrm>
-          <a:prstGeom prst="rect">
-            <a:avLst/>
-          </a:prstGeom>
-          <a:solidFill>
-            <a:srgbClr val="329BCA"/>
-          </a:solidFill>
-          <a:ln w="19050">
-            <a:solidFill>
-              <a:srgbClr val="1D5366"/>
-            </a:solidFill>
-          </a:ln>
-        </p:spPr>
-        <p:style>
-          <a:lnRef idx="2">
-            <a:schemeClr val="accent1">
-              <a:shade val="50000"/>
-            </a:schemeClr>
-          </a:lnRef>
-          <a:fillRef idx="1">
-            <a:schemeClr val="accent1"/>
-          </a:fillRef>
-          <a:effectRef idx="0">
-            <a:schemeClr val="accent1"/>
-          </a:effectRef>
-          <a:fontRef idx="minor">
-            <a:schemeClr val="lt1"/>
-          </a:fontRef>
-        </p:style>
-        <p:txBody>
-          <a:bodyPr rtlCol="0" anchor="ctr"/>
-          <a:lstStyle/>
-          <a:p>
-            <a:pPr algn="ctr"/>
-            <a:r>
-              <a:rPr lang="en-US" sz="1600" dirty="0"/>
-              <a:t>Collector service 1</a:t>
-            </a:r>
-          </a:p>
-        </p:txBody>
-      </p:sp>
-      <p:sp>
-        <p:nvSpPr>
-          <p:cNvPr id="10" name="Rectangle 9">
-            <a:extLst>
-              <a:ext uri="{FF2B5EF4-FFF2-40B4-BE49-F238E27FC236}">
-                <a16:creationId xmlns:a16="http://schemas.microsoft.com/office/drawing/2014/main" id="{982E3BBB-7638-D217-1ED2-47938B0F9B83}"/>
-              </a:ext>
-            </a:extLst>
-          </p:cNvPr>
-          <p:cNvSpPr/>
-          <p:nvPr/>
-        </p:nvSpPr>
-        <p:spPr>
-          <a:xfrm>
-            <a:off x="3402919" y="3973285"/>
-            <a:ext cx="1270223" cy="771782"/>
-          </a:xfrm>
-          <a:prstGeom prst="rect">
-            <a:avLst/>
-          </a:prstGeom>
-          <a:solidFill>
-            <a:srgbClr val="329BCA"/>
-          </a:solidFill>
-          <a:ln w="19050">
-            <a:solidFill>
-              <a:srgbClr val="1D5366"/>
-            </a:solidFill>
-          </a:ln>
-        </p:spPr>
-        <p:style>
-          <a:lnRef idx="2">
-            <a:schemeClr val="accent1">
-              <a:shade val="50000"/>
-            </a:schemeClr>
-          </a:lnRef>
-          <a:fillRef idx="1">
-            <a:schemeClr val="accent1"/>
-          </a:fillRef>
-          <a:effectRef idx="0">
-            <a:schemeClr val="accent1"/>
-          </a:effectRef>
-          <a:fontRef idx="minor">
-            <a:schemeClr val="lt1"/>
-          </a:fontRef>
-        </p:style>
-        <p:txBody>
-          <a:bodyPr rtlCol="0" anchor="ctr"/>
-          <a:lstStyle/>
-          <a:p>
-            <a:pPr algn="ctr"/>
-            <a:r>
-              <a:rPr lang="en-US" sz="1600" dirty="0"/>
-              <a:t>Collector service 2</a:t>
-            </a:r>
-          </a:p>
-        </p:txBody>
-      </p:sp>
-      <p:sp>
-        <p:nvSpPr>
-          <p:cNvPr id="11" name="Rectangle 10">
-            <a:extLst>
-              <a:ext uri="{FF2B5EF4-FFF2-40B4-BE49-F238E27FC236}">
-                <a16:creationId xmlns:a16="http://schemas.microsoft.com/office/drawing/2014/main" id="{0295A62F-DCCF-D57C-AB85-D6EEA5964828}"/>
-              </a:ext>
-            </a:extLst>
-          </p:cNvPr>
-          <p:cNvSpPr/>
-          <p:nvPr/>
-        </p:nvSpPr>
-        <p:spPr>
-          <a:xfrm>
-            <a:off x="5774585" y="2270333"/>
-            <a:ext cx="1397245" cy="1273439"/>
-          </a:xfrm>
-          <a:prstGeom prst="rect">
-            <a:avLst/>
-          </a:prstGeom>
-          <a:solidFill>
-            <a:srgbClr val="329BCA"/>
-          </a:solidFill>
-          <a:ln w="19050">
-            <a:solidFill>
-              <a:srgbClr val="1D5366"/>
-            </a:solidFill>
-          </a:ln>
-        </p:spPr>
-        <p:style>
-          <a:lnRef idx="2">
-            <a:schemeClr val="accent1">
-              <a:shade val="50000"/>
-            </a:schemeClr>
-          </a:lnRef>
-          <a:fillRef idx="1">
-            <a:schemeClr val="accent1"/>
-          </a:fillRef>
-          <a:effectRef idx="0">
-            <a:schemeClr val="accent1"/>
-          </a:effectRef>
-          <a:fontRef idx="minor">
-            <a:schemeClr val="lt1"/>
-          </a:fontRef>
-        </p:style>
-        <p:txBody>
-          <a:bodyPr rtlCol="0" anchor="t" anchorCtr="0"/>
-          <a:lstStyle/>
-          <a:p>
-            <a:pPr algn="ctr"/>
-            <a:r>
-              <a:rPr lang="en-US" sz="1600" dirty="0"/>
-              <a:t>Indexer</a:t>
-            </a:r>
-          </a:p>
-        </p:txBody>
-      </p:sp>
-      <p:sp>
-        <p:nvSpPr>
-          <p:cNvPr id="7" name="Can 6">
-            <a:extLst>
-              <a:ext uri="{FF2B5EF4-FFF2-40B4-BE49-F238E27FC236}">
-                <a16:creationId xmlns:a16="http://schemas.microsoft.com/office/drawing/2014/main" id="{449D2A16-258F-D50E-1916-BE797C0ECFA7}"/>
-              </a:ext>
-            </a:extLst>
-          </p:cNvPr>
-          <p:cNvSpPr/>
-          <p:nvPr/>
-        </p:nvSpPr>
-        <p:spPr>
-          <a:xfrm>
-            <a:off x="6012405" y="2559773"/>
-            <a:ext cx="919705" cy="906441"/>
-          </a:xfrm>
-          <a:prstGeom prst="can">
-            <a:avLst/>
-          </a:prstGeom>
-          <a:solidFill>
-            <a:srgbClr val="1D5366"/>
-          </a:solidFill>
-          <a:ln w="19050">
-            <a:solidFill>
-              <a:srgbClr val="329BCA"/>
-            </a:solidFill>
-          </a:ln>
-        </p:spPr>
-        <p:style>
-          <a:lnRef idx="2">
-            <a:schemeClr val="accent1">
-              <a:shade val="50000"/>
-            </a:schemeClr>
-          </a:lnRef>
-          <a:fillRef idx="1">
-            <a:schemeClr val="accent1"/>
-          </a:fillRef>
-          <a:effectRef idx="0">
-            <a:schemeClr val="accent1"/>
-          </a:effectRef>
-          <a:fontRef idx="minor">
-            <a:schemeClr val="lt1"/>
-          </a:fontRef>
-        </p:style>
-        <p:txBody>
-          <a:bodyPr rtlCol="0" anchor="ctr"/>
-          <a:lstStyle/>
-          <a:p>
-            <a:pPr algn="ctr"/>
-            <a:r>
-              <a:rPr lang="en-US" sz="1600" dirty="0"/>
-              <a:t>DB</a:t>
-            </a:r>
-          </a:p>
-        </p:txBody>
-      </p:sp>
-      <p:sp>
-        <p:nvSpPr>
-          <p:cNvPr id="28" name="Rectangle 27">
-            <a:extLst>
-              <a:ext uri="{FF2B5EF4-FFF2-40B4-BE49-F238E27FC236}">
-                <a16:creationId xmlns:a16="http://schemas.microsoft.com/office/drawing/2014/main" id="{235E3F9B-0A07-328C-5AEE-5D803EE5DA1C}"/>
-              </a:ext>
-            </a:extLst>
-          </p:cNvPr>
-          <p:cNvSpPr/>
-          <p:nvPr/>
-        </p:nvSpPr>
-        <p:spPr>
-          <a:xfrm>
-            <a:off x="8329304" y="3050183"/>
-            <a:ext cx="1270223" cy="848960"/>
-          </a:xfrm>
-          <a:prstGeom prst="rect">
-            <a:avLst/>
-          </a:prstGeom>
-          <a:solidFill>
-            <a:srgbClr val="329BCA"/>
-          </a:solidFill>
-          <a:ln w="19050">
-            <a:solidFill>
-              <a:srgbClr val="1D5366"/>
-            </a:solidFill>
-          </a:ln>
-        </p:spPr>
-        <p:style>
-          <a:lnRef idx="2">
-            <a:schemeClr val="accent1">
-              <a:shade val="50000"/>
-            </a:schemeClr>
-          </a:lnRef>
-          <a:fillRef idx="1">
-            <a:schemeClr val="accent1"/>
-          </a:fillRef>
-          <a:effectRef idx="0">
-            <a:schemeClr val="accent1"/>
-          </a:effectRef>
-          <a:fontRef idx="minor">
-            <a:schemeClr val="lt1"/>
-          </a:fontRef>
-        </p:style>
-        <p:txBody>
-          <a:bodyPr rtlCol="0" anchor="ctr"/>
-          <a:lstStyle/>
-          <a:p>
-            <a:pPr algn="ctr"/>
-            <a:r>
-              <a:rPr lang="en-US" sz="1600" dirty="0"/>
-              <a:t>Data retriever</a:t>
-            </a:r>
-          </a:p>
-          <a:p>
-            <a:pPr algn="ctr"/>
-            <a:r>
-              <a:rPr lang="en-US" sz="1600" dirty="0"/>
-              <a:t>service</a:t>
-            </a:r>
-          </a:p>
-        </p:txBody>
-      </p:sp>
-      <p:sp>
-        <p:nvSpPr>
-          <p:cNvPr id="29" name="Rectangle 28">
-            <a:extLst>
-              <a:ext uri="{FF2B5EF4-FFF2-40B4-BE49-F238E27FC236}">
-                <a16:creationId xmlns:a16="http://schemas.microsoft.com/office/drawing/2014/main" id="{F40C3199-66D6-7AB2-E682-59158549655A}"/>
-              </a:ext>
-            </a:extLst>
-          </p:cNvPr>
-          <p:cNvSpPr/>
-          <p:nvPr/>
-        </p:nvSpPr>
-        <p:spPr>
-          <a:xfrm>
-            <a:off x="10766585" y="2322801"/>
+            <a:off x="8696763" y="440607"/>
             <a:ext cx="1270223" cy="848960"/>
           </a:xfrm>
           <a:prstGeom prst="rect">
@@ -3804,17 +3571,17 @@
             <a:pPr algn="ctr"/>
             <a:r>
               <a:rPr lang="en-US" sz="1600" dirty="0"/>
-              <a:t>SDS client 1</a:t>
-            </a:r>
-          </a:p>
-        </p:txBody>
-      </p:sp>
-      <p:sp>
-        <p:nvSpPr>
-          <p:cNvPr id="30" name="Rectangle 29">
-            <a:extLst>
-              <a:ext uri="{FF2B5EF4-FFF2-40B4-BE49-F238E27FC236}">
-                <a16:creationId xmlns:a16="http://schemas.microsoft.com/office/drawing/2014/main" id="{5BFED5FD-008C-7D28-33A0-C066DF9EA662}"/>
+              <a:t>SDS client 2</a:t>
+            </a:r>
+          </a:p>
+        </p:txBody>
+      </p:sp>
+      <p:sp>
+        <p:nvSpPr>
+          <p:cNvPr id="31" name="Rectangle 30">
+            <a:extLst>
+              <a:ext uri="{FF2B5EF4-FFF2-40B4-BE49-F238E27FC236}">
+                <a16:creationId xmlns:a16="http://schemas.microsoft.com/office/drawing/2014/main" id="{CD7282B9-4BCB-8A9B-1CDB-6D0550993728}"/>
               </a:ext>
             </a:extLst>
           </p:cNvPr>
@@ -3823,8 +3590,8 @@
         </p:nvSpPr>
         <p:spPr>
           <a:xfrm>
-            <a:off x="10780476" y="3904215"/>
-            <a:ext cx="1270223" cy="848960"/>
+            <a:off x="1210507" y="440607"/>
+            <a:ext cx="717007" cy="579851"/>
           </a:xfrm>
           <a:prstGeom prst="rect">
             <a:avLst/>
@@ -3861,17 +3628,17 @@
             <a:pPr algn="ctr"/>
             <a:r>
               <a:rPr lang="en-US" sz="1600" dirty="0"/>
-              <a:t>SDS client 2</a:t>
-            </a:r>
-          </a:p>
-        </p:txBody>
-      </p:sp>
-      <p:sp>
-        <p:nvSpPr>
-          <p:cNvPr id="31" name="Rectangle 30">
-            <a:extLst>
-              <a:ext uri="{FF2B5EF4-FFF2-40B4-BE49-F238E27FC236}">
-                <a16:creationId xmlns:a16="http://schemas.microsoft.com/office/drawing/2014/main" id="{CD7282B9-4BCB-8A9B-1CDB-6D0550993728}"/>
+              <a:t>IOC 1</a:t>
+            </a:r>
+          </a:p>
+        </p:txBody>
+      </p:sp>
+      <p:sp>
+        <p:nvSpPr>
+          <p:cNvPr id="34" name="Rectangle 33">
+            <a:extLst>
+              <a:ext uri="{FF2B5EF4-FFF2-40B4-BE49-F238E27FC236}">
+                <a16:creationId xmlns:a16="http://schemas.microsoft.com/office/drawing/2014/main" id="{DC7F35FD-970D-A84C-ABFE-526FDE1153F1}"/>
               </a:ext>
             </a:extLst>
           </p:cNvPr>
@@ -3880,7 +3647,7 @@
         </p:nvSpPr>
         <p:spPr>
           <a:xfrm>
-            <a:off x="814746" y="2609929"/>
+            <a:off x="2218696" y="440607"/>
             <a:ext cx="717007" cy="579851"/>
           </a:xfrm>
           <a:prstGeom prst="rect">
@@ -3918,177 +3685,6 @@
             <a:pPr algn="ctr"/>
             <a:r>
               <a:rPr lang="en-US" sz="1600" dirty="0"/>
-              <a:t>IOC 1</a:t>
-            </a:r>
-          </a:p>
-        </p:txBody>
-      </p:sp>
-      <p:sp>
-        <p:nvSpPr>
-          <p:cNvPr id="32" name="Rectangle 31">
-            <a:extLst>
-              <a:ext uri="{FF2B5EF4-FFF2-40B4-BE49-F238E27FC236}">
-                <a16:creationId xmlns:a16="http://schemas.microsoft.com/office/drawing/2014/main" id="{1B3EE62D-8A8A-6344-0860-323BF662CF67}"/>
-              </a:ext>
-            </a:extLst>
-          </p:cNvPr>
-          <p:cNvSpPr/>
-          <p:nvPr/>
-        </p:nvSpPr>
-        <p:spPr>
-          <a:xfrm>
-            <a:off x="926866" y="3884687"/>
-            <a:ext cx="717007" cy="579851"/>
-          </a:xfrm>
-          <a:prstGeom prst="rect">
-            <a:avLst/>
-          </a:prstGeom>
-          <a:solidFill>
-            <a:srgbClr val="97BCCA"/>
-          </a:solidFill>
-          <a:ln w="19050">
-            <a:solidFill>
-              <a:srgbClr val="1D5366"/>
-            </a:solidFill>
-          </a:ln>
-        </p:spPr>
-        <p:style>
-          <a:lnRef idx="2">
-            <a:schemeClr val="accent1">
-              <a:shade val="50000"/>
-            </a:schemeClr>
-          </a:lnRef>
-          <a:fillRef idx="1">
-            <a:schemeClr val="accent1"/>
-          </a:fillRef>
-          <a:effectRef idx="0">
-            <a:schemeClr val="accent1"/>
-          </a:effectRef>
-          <a:fontRef idx="minor">
-            <a:schemeClr val="lt1"/>
-          </a:fontRef>
-        </p:style>
-        <p:txBody>
-          <a:bodyPr rtlCol="0" anchor="ctr"/>
-          <a:lstStyle/>
-          <a:p>
-            <a:pPr algn="ctr"/>
-            <a:r>
-              <a:rPr lang="en-US" sz="1600" dirty="0"/>
-              <a:t>IOC 3</a:t>
-            </a:r>
-          </a:p>
-        </p:txBody>
-      </p:sp>
-      <p:sp>
-        <p:nvSpPr>
-          <p:cNvPr id="33" name="Rectangle 32">
-            <a:extLst>
-              <a:ext uri="{FF2B5EF4-FFF2-40B4-BE49-F238E27FC236}">
-                <a16:creationId xmlns:a16="http://schemas.microsoft.com/office/drawing/2014/main" id="{9745F7A8-7C0F-E9B9-5463-43BCADDA3754}"/>
-              </a:ext>
-            </a:extLst>
-          </p:cNvPr>
-          <p:cNvSpPr/>
-          <p:nvPr/>
-        </p:nvSpPr>
-        <p:spPr>
-          <a:xfrm>
-            <a:off x="1951941" y="3884687"/>
-            <a:ext cx="717007" cy="579851"/>
-          </a:xfrm>
-          <a:prstGeom prst="rect">
-            <a:avLst/>
-          </a:prstGeom>
-          <a:solidFill>
-            <a:srgbClr val="97BCCA"/>
-          </a:solidFill>
-          <a:ln w="19050">
-            <a:solidFill>
-              <a:srgbClr val="1D5366"/>
-            </a:solidFill>
-          </a:ln>
-        </p:spPr>
-        <p:style>
-          <a:lnRef idx="2">
-            <a:schemeClr val="accent1">
-              <a:shade val="50000"/>
-            </a:schemeClr>
-          </a:lnRef>
-          <a:fillRef idx="1">
-            <a:schemeClr val="accent1"/>
-          </a:fillRef>
-          <a:effectRef idx="0">
-            <a:schemeClr val="accent1"/>
-          </a:effectRef>
-          <a:fontRef idx="minor">
-            <a:schemeClr val="lt1"/>
-          </a:fontRef>
-        </p:style>
-        <p:txBody>
-          <a:bodyPr rtlCol="0" anchor="ctr"/>
-          <a:lstStyle/>
-          <a:p>
-            <a:pPr algn="ctr"/>
-            <a:r>
-              <a:rPr lang="en-US" sz="1600" dirty="0"/>
-              <a:t>IOC 4</a:t>
-            </a:r>
-          </a:p>
-        </p:txBody>
-      </p:sp>
-      <p:sp>
-        <p:nvSpPr>
-          <p:cNvPr id="34" name="Rectangle 33">
-            <a:extLst>
-              <a:ext uri="{FF2B5EF4-FFF2-40B4-BE49-F238E27FC236}">
-                <a16:creationId xmlns:a16="http://schemas.microsoft.com/office/drawing/2014/main" id="{DC7F35FD-970D-A84C-ABFE-526FDE1153F1}"/>
-              </a:ext>
-            </a:extLst>
-          </p:cNvPr>
-          <p:cNvSpPr/>
-          <p:nvPr/>
-        </p:nvSpPr>
-        <p:spPr>
-          <a:xfrm>
-            <a:off x="1839821" y="2609928"/>
-            <a:ext cx="717007" cy="579851"/>
-          </a:xfrm>
-          <a:prstGeom prst="rect">
-            <a:avLst/>
-          </a:prstGeom>
-          <a:solidFill>
-            <a:srgbClr val="97BCCA"/>
-          </a:solidFill>
-          <a:ln w="19050">
-            <a:solidFill>
-              <a:srgbClr val="1D5366"/>
-            </a:solidFill>
-          </a:ln>
-        </p:spPr>
-        <p:style>
-          <a:lnRef idx="2">
-            <a:schemeClr val="accent1">
-              <a:shade val="50000"/>
-            </a:schemeClr>
-          </a:lnRef>
-          <a:fillRef idx="1">
-            <a:schemeClr val="accent1"/>
-          </a:fillRef>
-          <a:effectRef idx="0">
-            <a:schemeClr val="accent1"/>
-          </a:effectRef>
-          <a:fontRef idx="minor">
-            <a:schemeClr val="lt1"/>
-          </a:fontRef>
-        </p:style>
-        <p:txBody>
-          <a:bodyPr rtlCol="0" anchor="ctr"/>
-          <a:lstStyle/>
-          <a:p>
-            <a:pPr algn="ctr"/>
-            <a:r>
-              <a:rPr lang="en-US" sz="1600" dirty="0"/>
               <a:t>IOC 2</a:t>
             </a:r>
           </a:p>
@@ -4110,7 +3706,7 @@
         </p:nvCxnSpPr>
         <p:spPr>
           <a:xfrm>
-            <a:off x="123570" y="3524388"/>
+            <a:off x="798706" y="1597828"/>
             <a:ext cx="4549572" cy="0"/>
           </a:xfrm>
           <a:prstGeom prst="line">
@@ -4149,9 +3745,9 @@
           <p:nvPr/>
         </p:nvCxnSpPr>
         <p:spPr>
-          <a:xfrm>
-            <a:off x="1173250" y="3189780"/>
-            <a:ext cx="0" cy="359370"/>
+          <a:xfrm flipH="1">
+            <a:off x="1569010" y="1020458"/>
+            <a:ext cx="1" cy="553094"/>
           </a:xfrm>
           <a:prstGeom prst="line">
             <a:avLst/>
@@ -4189,9 +3785,9 @@
           <p:nvPr/>
         </p:nvCxnSpPr>
         <p:spPr>
-          <a:xfrm flipH="1">
-            <a:off x="2198324" y="3189779"/>
-            <a:ext cx="1" cy="353792"/>
+          <a:xfrm>
+            <a:off x="2577200" y="1020458"/>
+            <a:ext cx="0" cy="545949"/>
           </a:xfrm>
           <a:prstGeom prst="line">
             <a:avLst/>
@@ -4224,13 +3820,14 @@
           </p:cNvPr>
           <p:cNvCxnSpPr>
             <a:cxnSpLocks/>
+            <a:endCxn id="9" idx="0"/>
           </p:cNvCxnSpPr>
           <p:nvPr/>
         </p:nvCxnSpPr>
         <p:spPr>
           <a:xfrm>
-            <a:off x="1309063" y="3536692"/>
-            <a:ext cx="0" cy="359370"/>
+            <a:off x="2173405" y="1573552"/>
+            <a:ext cx="1" cy="884620"/>
           </a:xfrm>
           <a:prstGeom prst="line">
             <a:avLst/>
@@ -4254,10 +3851,10 @@
       </p:cxnSp>
       <p:cxnSp>
         <p:nvCxnSpPr>
-          <p:cNvPr id="49" name="Straight Connector 48">
-            <a:extLst>
-              <a:ext uri="{FF2B5EF4-FFF2-40B4-BE49-F238E27FC236}">
-                <a16:creationId xmlns:a16="http://schemas.microsoft.com/office/drawing/2014/main" id="{5BE0FE91-ABD5-D0E8-5A2A-24B6D283C407}"/>
+          <p:cNvPr id="125" name="Straight Connector 124">
+            <a:extLst>
+              <a:ext uri="{FF2B5EF4-FFF2-40B4-BE49-F238E27FC236}">
+                <a16:creationId xmlns:a16="http://schemas.microsoft.com/office/drawing/2014/main" id="{98EE6DC2-4F13-C82F-8FD0-75EBD363C2A3}"/>
               </a:ext>
             </a:extLst>
           </p:cNvPr>
@@ -4267,9 +3864,225 @@
           <p:nvPr/>
         </p:nvCxnSpPr>
         <p:spPr>
-          <a:xfrm flipH="1">
-            <a:off x="2334137" y="3536691"/>
-            <a:ext cx="1" cy="353792"/>
+          <a:xfrm>
+            <a:off x="600066" y="3830184"/>
+            <a:ext cx="10721946" cy="0"/>
+          </a:xfrm>
+          <a:prstGeom prst="line">
+            <a:avLst/>
+          </a:prstGeom>
+          <a:ln w="38100">
+            <a:solidFill>
+              <a:srgbClr val="97BCCA"/>
+            </a:solidFill>
+          </a:ln>
+        </p:spPr>
+        <p:style>
+          <a:lnRef idx="1">
+            <a:schemeClr val="accent1"/>
+          </a:lnRef>
+          <a:fillRef idx="0">
+            <a:schemeClr val="accent1"/>
+          </a:fillRef>
+          <a:effectRef idx="0">
+            <a:schemeClr val="accent1"/>
+          </a:effectRef>
+          <a:fontRef idx="minor">
+            <a:schemeClr val="tx1"/>
+          </a:fontRef>
+        </p:style>
+      </p:cxnSp>
+      <p:cxnSp>
+        <p:nvCxnSpPr>
+          <p:cNvPr id="93" name="Elbow Connector 92">
+            <a:extLst>
+              <a:ext uri="{FF2B5EF4-FFF2-40B4-BE49-F238E27FC236}">
+                <a16:creationId xmlns:a16="http://schemas.microsoft.com/office/drawing/2014/main" id="{FBEC1BCF-01B0-3472-F55B-BD3C6CB50E4A}"/>
+              </a:ext>
+            </a:extLst>
+          </p:cNvPr>
+          <p:cNvCxnSpPr>
+            <a:cxnSpLocks/>
+          </p:cNvCxnSpPr>
+          <p:nvPr/>
+        </p:nvCxnSpPr>
+        <p:spPr>
+          <a:xfrm rot="16200000" flipH="1">
+            <a:off x="2321088" y="2944708"/>
+            <a:ext cx="1491176" cy="2061668"/>
+          </a:xfrm>
+          <a:prstGeom prst="bentConnector2">
+            <a:avLst/>
+          </a:prstGeom>
+          <a:ln w="19050">
+            <a:solidFill>
+              <a:srgbClr val="1D5366"/>
+            </a:solidFill>
+            <a:headEnd type="none" w="med" len="med"/>
+            <a:tailEnd type="arrow" w="med" len="med"/>
+          </a:ln>
+        </p:spPr>
+        <p:style>
+          <a:lnRef idx="1">
+            <a:schemeClr val="accent1"/>
+          </a:lnRef>
+          <a:fillRef idx="0">
+            <a:schemeClr val="accent1"/>
+          </a:fillRef>
+          <a:effectRef idx="0">
+            <a:schemeClr val="accent1"/>
+          </a:effectRef>
+          <a:fontRef idx="minor">
+            <a:schemeClr val="tx1"/>
+          </a:fontRef>
+        </p:style>
+      </p:cxnSp>
+      <p:cxnSp>
+        <p:nvCxnSpPr>
+          <p:cNvPr id="96" name="Elbow Connector 95">
+            <a:extLst>
+              <a:ext uri="{FF2B5EF4-FFF2-40B4-BE49-F238E27FC236}">
+                <a16:creationId xmlns:a16="http://schemas.microsoft.com/office/drawing/2014/main" id="{9C40A1CE-9541-3E1E-CA25-F7CFDC55531A}"/>
+              </a:ext>
+            </a:extLst>
+          </p:cNvPr>
+          <p:cNvCxnSpPr>
+            <a:cxnSpLocks/>
+            <a:stCxn id="10" idx="2"/>
+            <a:endCxn id="2" idx="2"/>
+          </p:cNvCxnSpPr>
+          <p:nvPr/>
+        </p:nvCxnSpPr>
+        <p:spPr>
+          <a:xfrm rot="16200000" flipH="1">
+            <a:off x="3216125" y="3843971"/>
+            <a:ext cx="1491178" cy="263143"/>
+          </a:xfrm>
+          <a:prstGeom prst="bentConnector2">
+            <a:avLst/>
+          </a:prstGeom>
+          <a:ln w="19050">
+            <a:solidFill>
+              <a:srgbClr val="1D5366"/>
+            </a:solidFill>
+            <a:headEnd type="none" w="med" len="med"/>
+            <a:tailEnd type="arrow" w="med" len="med"/>
+          </a:ln>
+        </p:spPr>
+        <p:style>
+          <a:lnRef idx="1">
+            <a:schemeClr val="accent1"/>
+          </a:lnRef>
+          <a:fillRef idx="0">
+            <a:schemeClr val="accent1"/>
+          </a:fillRef>
+          <a:effectRef idx="0">
+            <a:schemeClr val="accent1"/>
+          </a:effectRef>
+          <a:fontRef idx="minor">
+            <a:schemeClr val="tx1"/>
+          </a:fontRef>
+        </p:style>
+      </p:cxnSp>
+      <p:sp>
+        <p:nvSpPr>
+          <p:cNvPr id="70" name="TextBox 69">
+            <a:extLst>
+              <a:ext uri="{FF2B5EF4-FFF2-40B4-BE49-F238E27FC236}">
+                <a16:creationId xmlns:a16="http://schemas.microsoft.com/office/drawing/2014/main" id="{D704C1F0-C6F8-D371-9C42-4DDABA7AD49F}"/>
+              </a:ext>
+            </a:extLst>
+          </p:cNvPr>
+          <p:cNvSpPr txBox="1"/>
+          <p:nvPr/>
+        </p:nvSpPr>
+        <p:spPr>
+          <a:xfrm>
+            <a:off x="698956" y="1258630"/>
+            <a:ext cx="961779" cy="307777"/>
+          </a:xfrm>
+          <a:prstGeom prst="rect">
+            <a:avLst/>
+          </a:prstGeom>
+          <a:noFill/>
+        </p:spPr>
+        <p:txBody>
+          <a:bodyPr wrap="square" rtlCol="0">
+            <a:spAutoFit/>
+          </a:bodyPr>
+          <a:lstStyle/>
+          <a:p>
+            <a:r>
+              <a:rPr lang="en-US" sz="1400" dirty="0"/>
+              <a:t>PV Access</a:t>
+            </a:r>
+          </a:p>
+        </p:txBody>
+      </p:sp>
+      <p:cxnSp>
+        <p:nvCxnSpPr>
+          <p:cNvPr id="24" name="Straight Arrow Connector 23">
+            <a:extLst>
+              <a:ext uri="{FF2B5EF4-FFF2-40B4-BE49-F238E27FC236}">
+                <a16:creationId xmlns:a16="http://schemas.microsoft.com/office/drawing/2014/main" id="{B98402DE-2C21-0A1A-6D33-E529EF5DB5E6}"/>
+              </a:ext>
+            </a:extLst>
+          </p:cNvPr>
+          <p:cNvCxnSpPr>
+            <a:cxnSpLocks/>
+          </p:cNvCxnSpPr>
+          <p:nvPr/>
+        </p:nvCxnSpPr>
+        <p:spPr>
+          <a:xfrm>
+            <a:off x="1667656" y="1036113"/>
+            <a:ext cx="0" cy="521729"/>
+          </a:xfrm>
+          <a:prstGeom prst="straightConnector1">
+            <a:avLst/>
+          </a:prstGeom>
+          <a:ln w="19050">
+            <a:solidFill>
+              <a:srgbClr val="C00000"/>
+            </a:solidFill>
+            <a:headEnd type="none" w="med" len="med"/>
+            <a:tailEnd type="arrow" w="med" len="med"/>
+          </a:ln>
+        </p:spPr>
+        <p:style>
+          <a:lnRef idx="1">
+            <a:schemeClr val="accent1"/>
+          </a:lnRef>
+          <a:fillRef idx="0">
+            <a:schemeClr val="accent1"/>
+          </a:fillRef>
+          <a:effectRef idx="0">
+            <a:schemeClr val="accent1"/>
+          </a:effectRef>
+          <a:fontRef idx="minor">
+            <a:schemeClr val="tx1"/>
+          </a:fontRef>
+        </p:style>
+      </p:cxnSp>
+      <p:cxnSp>
+        <p:nvCxnSpPr>
+          <p:cNvPr id="39" name="Straight Connector 38">
+            <a:extLst>
+              <a:ext uri="{FF2B5EF4-FFF2-40B4-BE49-F238E27FC236}">
+                <a16:creationId xmlns:a16="http://schemas.microsoft.com/office/drawing/2014/main" id="{5A1B3439-204A-A7EC-2A8C-CF6836DD37F6}"/>
+              </a:ext>
+            </a:extLst>
+          </p:cNvPr>
+          <p:cNvCxnSpPr>
+            <a:cxnSpLocks/>
+            <a:endCxn id="10" idx="0"/>
+          </p:cNvCxnSpPr>
+          <p:nvPr/>
+        </p:nvCxnSpPr>
+        <p:spPr>
+          <a:xfrm>
+            <a:off x="3825312" y="1566407"/>
+            <a:ext cx="4831" cy="891765"/>
           </a:xfrm>
           <a:prstGeom prst="line">
             <a:avLst/>
@@ -4293,10 +4106,10 @@
       </p:cxnSp>
       <p:cxnSp>
         <p:nvCxnSpPr>
-          <p:cNvPr id="51" name="Curved Connector 50">
-            <a:extLst>
-              <a:ext uri="{FF2B5EF4-FFF2-40B4-BE49-F238E27FC236}">
-                <a16:creationId xmlns:a16="http://schemas.microsoft.com/office/drawing/2014/main" id="{34FC2DB3-E246-0544-A8D8-C24993C3D491}"/>
+          <p:cNvPr id="56" name="Straight Arrow Connector 55">
+            <a:extLst>
+              <a:ext uri="{FF2B5EF4-FFF2-40B4-BE49-F238E27FC236}">
+                <a16:creationId xmlns:a16="http://schemas.microsoft.com/office/drawing/2014/main" id="{551C95F9-E350-3F6E-A9CF-80BE2432ABCC}"/>
               </a:ext>
             </a:extLst>
           </p:cNvPr>
@@ -4306,18 +4119,19 @@
           <p:nvPr/>
         </p:nvCxnSpPr>
         <p:spPr>
-          <a:xfrm rot="16200000" flipH="1">
-            <a:off x="1344364" y="3143088"/>
-            <a:ext cx="255682" cy="373672"/>
-          </a:xfrm>
-          <a:prstGeom prst="curvedConnector2">
+          <a:xfrm>
+            <a:off x="3697408" y="1036113"/>
+            <a:ext cx="0" cy="521729"/>
+          </a:xfrm>
+          <a:prstGeom prst="straightConnector1">
             <a:avLst/>
           </a:prstGeom>
           <a:ln w="19050">
             <a:solidFill>
               <a:srgbClr val="C00000"/>
             </a:solidFill>
-            <a:tailEnd type="triangle"/>
+            <a:headEnd type="none" w="med" len="med"/>
+            <a:tailEnd type="arrow" w="med" len="med"/>
           </a:ln>
         </p:spPr>
         <p:style>
@@ -4337,10 +4151,10 @@
       </p:cxnSp>
       <p:cxnSp>
         <p:nvCxnSpPr>
-          <p:cNvPr id="64" name="Curved Connector 63">
-            <a:extLst>
-              <a:ext uri="{FF2B5EF4-FFF2-40B4-BE49-F238E27FC236}">
-                <a16:creationId xmlns:a16="http://schemas.microsoft.com/office/drawing/2014/main" id="{69295A4A-A35B-67D3-E008-36B77E95D2ED}"/>
+          <p:cNvPr id="57" name="Straight Arrow Connector 56">
+            <a:extLst>
+              <a:ext uri="{FF2B5EF4-FFF2-40B4-BE49-F238E27FC236}">
+                <a16:creationId xmlns:a16="http://schemas.microsoft.com/office/drawing/2014/main" id="{128933ED-48C0-FFCB-E46A-E29C29CEE3A0}"/>
               </a:ext>
             </a:extLst>
           </p:cNvPr>
@@ -4350,18 +4164,19 @@
           <p:nvPr/>
         </p:nvCxnSpPr>
         <p:spPr>
-          <a:xfrm rot="16200000" flipH="1">
-            <a:off x="2337407" y="3155951"/>
-            <a:ext cx="255682" cy="373672"/>
-          </a:xfrm>
-          <a:prstGeom prst="curvedConnector2">
+          <a:xfrm>
+            <a:off x="2263769" y="1620706"/>
+            <a:ext cx="0" cy="796449"/>
+          </a:xfrm>
+          <a:prstGeom prst="straightConnector1">
             <a:avLst/>
           </a:prstGeom>
           <a:ln w="19050">
             <a:solidFill>
               <a:srgbClr val="C00000"/>
             </a:solidFill>
-            <a:tailEnd type="triangle"/>
+            <a:headEnd type="none" w="med" len="med"/>
+            <a:tailEnd type="arrow" w="med" len="med"/>
           </a:ln>
         </p:spPr>
         <p:style>
@@ -4381,10 +4196,10 @@
       </p:cxnSp>
       <p:cxnSp>
         <p:nvCxnSpPr>
-          <p:cNvPr id="65" name="Curved Connector 64">
-            <a:extLst>
-              <a:ext uri="{FF2B5EF4-FFF2-40B4-BE49-F238E27FC236}">
-                <a16:creationId xmlns:a16="http://schemas.microsoft.com/office/drawing/2014/main" id="{A6B5F242-0107-7B1E-6B7B-D2981E1BE071}"/>
+          <p:cNvPr id="59" name="Straight Arrow Connector 58">
+            <a:extLst>
+              <a:ext uri="{FF2B5EF4-FFF2-40B4-BE49-F238E27FC236}">
+                <a16:creationId xmlns:a16="http://schemas.microsoft.com/office/drawing/2014/main" id="{A5077641-63DE-474C-9B95-2266AE9F0CA9}"/>
               </a:ext>
             </a:extLst>
           </p:cNvPr>
@@ -4394,18 +4209,19 @@
           <p:nvPr/>
         </p:nvCxnSpPr>
         <p:spPr>
-          <a:xfrm rot="5400000" flipH="1" flipV="1">
-            <a:off x="2504951" y="3532016"/>
-            <a:ext cx="255682" cy="373672"/>
-          </a:xfrm>
-          <a:prstGeom prst="curvedConnector2">
+          <a:xfrm>
+            <a:off x="4699472" y="1036113"/>
+            <a:ext cx="0" cy="521729"/>
+          </a:xfrm>
+          <a:prstGeom prst="straightConnector1">
             <a:avLst/>
           </a:prstGeom>
           <a:ln w="19050">
             <a:solidFill>
               <a:srgbClr val="00B050"/>
             </a:solidFill>
-            <a:tailEnd type="triangle"/>
+            <a:headEnd type="none" w="med" len="med"/>
+            <a:tailEnd type="arrow" w="med" len="med"/>
           </a:ln>
         </p:spPr>
         <p:style>
@@ -4425,10 +4241,10 @@
       </p:cxnSp>
       <p:cxnSp>
         <p:nvCxnSpPr>
-          <p:cNvPr id="66" name="Curved Connector 65">
-            <a:extLst>
-              <a:ext uri="{FF2B5EF4-FFF2-40B4-BE49-F238E27FC236}">
-                <a16:creationId xmlns:a16="http://schemas.microsoft.com/office/drawing/2014/main" id="{9DCF0ACA-65CD-705E-6341-BF9CB5C41E0E}"/>
+          <p:cNvPr id="60" name="Straight Arrow Connector 59">
+            <a:extLst>
+              <a:ext uri="{FF2B5EF4-FFF2-40B4-BE49-F238E27FC236}">
+                <a16:creationId xmlns:a16="http://schemas.microsoft.com/office/drawing/2014/main" id="{FBA53834-B914-C690-11A6-3AB09E2904FA}"/>
               </a:ext>
             </a:extLst>
           </p:cNvPr>
@@ -4438,18 +4254,19 @@
           <p:nvPr/>
         </p:nvCxnSpPr>
         <p:spPr>
-          <a:xfrm rot="5400000" flipH="1" flipV="1">
-            <a:off x="1455958" y="3539047"/>
-            <a:ext cx="255682" cy="373672"/>
-          </a:xfrm>
-          <a:prstGeom prst="curvedConnector2">
+          <a:xfrm>
+            <a:off x="2683207" y="1036113"/>
+            <a:ext cx="0" cy="521729"/>
+          </a:xfrm>
+          <a:prstGeom prst="straightConnector1">
             <a:avLst/>
           </a:prstGeom>
           <a:ln w="19050">
             <a:solidFill>
               <a:srgbClr val="00B050"/>
             </a:solidFill>
-            <a:tailEnd type="triangle"/>
+            <a:headEnd type="none" w="med" len="med"/>
+            <a:tailEnd type="arrow" w="med" len="med"/>
           </a:ln>
         </p:spPr>
         <p:style>
@@ -4469,10 +4286,10 @@
       </p:cxnSp>
       <p:cxnSp>
         <p:nvCxnSpPr>
-          <p:cNvPr id="67" name="Straight Connector 66">
-            <a:extLst>
-              <a:ext uri="{FF2B5EF4-FFF2-40B4-BE49-F238E27FC236}">
-                <a16:creationId xmlns:a16="http://schemas.microsoft.com/office/drawing/2014/main" id="{76559E47-30B1-30AA-24E2-36E946F5926E}"/>
+          <p:cNvPr id="61" name="Straight Arrow Connector 60">
+            <a:extLst>
+              <a:ext uri="{FF2B5EF4-FFF2-40B4-BE49-F238E27FC236}">
+                <a16:creationId xmlns:a16="http://schemas.microsoft.com/office/drawing/2014/main" id="{83DDE0AD-0343-9C93-B032-7D7BB3F5F188}"/>
               </a:ext>
             </a:extLst>
           </p:cNvPr>
@@ -4483,8 +4300,636 @@
         </p:nvCxnSpPr>
         <p:spPr>
           <a:xfrm>
-            <a:off x="3883351" y="3040097"/>
-            <a:ext cx="0" cy="471988"/>
+            <a:off x="3940643" y="1620706"/>
+            <a:ext cx="0" cy="796449"/>
+          </a:xfrm>
+          <a:prstGeom prst="straightConnector1">
+            <a:avLst/>
+          </a:prstGeom>
+          <a:ln w="19050">
+            <a:solidFill>
+              <a:srgbClr val="00B050"/>
+            </a:solidFill>
+            <a:headEnd type="none" w="med" len="med"/>
+            <a:tailEnd type="arrow" w="med" len="med"/>
+          </a:ln>
+        </p:spPr>
+        <p:style>
+          <a:lnRef idx="1">
+            <a:schemeClr val="accent1"/>
+          </a:lnRef>
+          <a:fillRef idx="0">
+            <a:schemeClr val="accent1"/>
+          </a:fillRef>
+          <a:effectRef idx="0">
+            <a:schemeClr val="accent1"/>
+          </a:effectRef>
+          <a:fontRef idx="minor">
+            <a:schemeClr val="tx1"/>
+          </a:fontRef>
+        </p:style>
+      </p:cxnSp>
+      <p:cxnSp>
+        <p:nvCxnSpPr>
+          <p:cNvPr id="68" name="Straight Arrow Connector 67">
+            <a:extLst>
+              <a:ext uri="{FF2B5EF4-FFF2-40B4-BE49-F238E27FC236}">
+                <a16:creationId xmlns:a16="http://schemas.microsoft.com/office/drawing/2014/main" id="{CC8909D3-1EE7-9BA3-458A-178458C22366}"/>
+              </a:ext>
+            </a:extLst>
+          </p:cNvPr>
+          <p:cNvCxnSpPr>
+            <a:cxnSpLocks/>
+          </p:cNvCxnSpPr>
+          <p:nvPr/>
+        </p:nvCxnSpPr>
+        <p:spPr>
+          <a:xfrm>
+            <a:off x="4796576" y="1036113"/>
+            <a:ext cx="0" cy="521729"/>
+          </a:xfrm>
+          <a:prstGeom prst="straightConnector1">
+            <a:avLst/>
+          </a:prstGeom>
+          <a:ln w="19050">
+            <a:solidFill>
+              <a:srgbClr val="C00000"/>
+            </a:solidFill>
+            <a:headEnd type="none" w="med" len="med"/>
+            <a:tailEnd type="arrow" w="med" len="med"/>
+          </a:ln>
+        </p:spPr>
+        <p:style>
+          <a:lnRef idx="1">
+            <a:schemeClr val="accent1"/>
+          </a:lnRef>
+          <a:fillRef idx="0">
+            <a:schemeClr val="accent1"/>
+          </a:fillRef>
+          <a:effectRef idx="0">
+            <a:schemeClr val="accent1"/>
+          </a:effectRef>
+          <a:fontRef idx="minor">
+            <a:schemeClr val="tx1"/>
+          </a:fontRef>
+        </p:style>
+      </p:cxnSp>
+      <p:sp>
+        <p:nvSpPr>
+          <p:cNvPr id="101" name="TextBox 100">
+            <a:extLst>
+              <a:ext uri="{FF2B5EF4-FFF2-40B4-BE49-F238E27FC236}">
+                <a16:creationId xmlns:a16="http://schemas.microsoft.com/office/drawing/2014/main" id="{E9834D9E-BF95-B9A8-B3FD-427A05715AD4}"/>
+              </a:ext>
+            </a:extLst>
+          </p:cNvPr>
+          <p:cNvSpPr txBox="1"/>
+          <p:nvPr/>
+        </p:nvSpPr>
+        <p:spPr>
+          <a:xfrm rot="10800000" flipV="1">
+            <a:off x="2456079" y="4432147"/>
+            <a:ext cx="959247" cy="307777"/>
+          </a:xfrm>
+          <a:prstGeom prst="rect">
+            <a:avLst/>
+          </a:prstGeom>
+          <a:noFill/>
+        </p:spPr>
+        <p:txBody>
+          <a:bodyPr wrap="square" rtlCol="0">
+            <a:spAutoFit/>
+          </a:bodyPr>
+          <a:lstStyle/>
+          <a:p>
+            <a:r>
+              <a:rPr lang="en-US" sz="1400" dirty="0">
+                <a:solidFill>
+                  <a:srgbClr val="1D5366"/>
+                </a:solidFill>
+              </a:rPr>
+              <a:t>Nexus files</a:t>
+            </a:r>
+          </a:p>
+        </p:txBody>
+      </p:sp>
+      <p:cxnSp>
+        <p:nvCxnSpPr>
+          <p:cNvPr id="103" name="Straight Arrow Connector 102">
+            <a:extLst>
+              <a:ext uri="{FF2B5EF4-FFF2-40B4-BE49-F238E27FC236}">
+                <a16:creationId xmlns:a16="http://schemas.microsoft.com/office/drawing/2014/main" id="{B8680FF7-D44B-400E-31D9-D89A327F85E3}"/>
+              </a:ext>
+            </a:extLst>
+          </p:cNvPr>
+          <p:cNvCxnSpPr>
+            <a:cxnSpLocks/>
+          </p:cNvCxnSpPr>
+          <p:nvPr/>
+        </p:nvCxnSpPr>
+        <p:spPr>
+          <a:xfrm>
+            <a:off x="6545093" y="3229954"/>
+            <a:ext cx="0" cy="881284"/>
+          </a:xfrm>
+          <a:prstGeom prst="straightConnector1">
+            <a:avLst/>
+          </a:prstGeom>
+          <a:ln w="19050">
+            <a:solidFill>
+              <a:srgbClr val="1D5366"/>
+            </a:solidFill>
+            <a:headEnd type="arrow" w="med" len="med"/>
+            <a:tailEnd type="arrow" w="med" len="med"/>
+          </a:ln>
+        </p:spPr>
+        <p:style>
+          <a:lnRef idx="1">
+            <a:schemeClr val="accent1"/>
+          </a:lnRef>
+          <a:fillRef idx="0">
+            <a:schemeClr val="accent1"/>
+          </a:fillRef>
+          <a:effectRef idx="0">
+            <a:schemeClr val="accent1"/>
+          </a:effectRef>
+          <a:fontRef idx="minor">
+            <a:schemeClr val="tx1"/>
+          </a:fontRef>
+        </p:style>
+      </p:cxnSp>
+      <p:sp>
+        <p:nvSpPr>
+          <p:cNvPr id="104" name="TextBox 103">
+            <a:extLst>
+              <a:ext uri="{FF2B5EF4-FFF2-40B4-BE49-F238E27FC236}">
+                <a16:creationId xmlns:a16="http://schemas.microsoft.com/office/drawing/2014/main" id="{757B9313-2A29-0C1F-7149-9B616B4F8033}"/>
+              </a:ext>
+            </a:extLst>
+          </p:cNvPr>
+          <p:cNvSpPr txBox="1"/>
+          <p:nvPr/>
+        </p:nvSpPr>
+        <p:spPr>
+          <a:xfrm rot="10800000" flipV="1">
+            <a:off x="4477385" y="2944007"/>
+            <a:ext cx="989277" cy="307777"/>
+          </a:xfrm>
+          <a:prstGeom prst="rect">
+            <a:avLst/>
+          </a:prstGeom>
+          <a:noFill/>
+        </p:spPr>
+        <p:txBody>
+          <a:bodyPr wrap="square" rtlCol="0">
+            <a:spAutoFit/>
+          </a:bodyPr>
+          <a:lstStyle/>
+          <a:p>
+            <a:pPr algn="ctr"/>
+            <a:r>
+              <a:rPr lang="en-US" sz="1400" dirty="0">
+                <a:ln>
+                  <a:solidFill>
+                    <a:srgbClr val="329BCA"/>
+                  </a:solidFill>
+                </a:ln>
+                <a:solidFill>
+                  <a:srgbClr val="1D5366"/>
+                </a:solidFill>
+              </a:rPr>
+              <a:t>Metadata</a:t>
+            </a:r>
+          </a:p>
+        </p:txBody>
+      </p:sp>
+      <p:cxnSp>
+        <p:nvCxnSpPr>
+          <p:cNvPr id="106" name="Elbow Connector 105">
+            <a:extLst>
+              <a:ext uri="{FF2B5EF4-FFF2-40B4-BE49-F238E27FC236}">
+                <a16:creationId xmlns:a16="http://schemas.microsoft.com/office/drawing/2014/main" id="{09BC618D-0C56-8F36-1492-A533E9A70D25}"/>
+              </a:ext>
+            </a:extLst>
+          </p:cNvPr>
+          <p:cNvCxnSpPr>
+            <a:cxnSpLocks/>
+            <a:stCxn id="28" idx="2"/>
+            <a:endCxn id="7" idx="4"/>
+          </p:cNvCxnSpPr>
+          <p:nvPr/>
+        </p:nvCxnSpPr>
+        <p:spPr>
+          <a:xfrm rot="5400000">
+            <a:off x="7280566" y="3609086"/>
+            <a:ext cx="1452589" cy="771503"/>
+          </a:xfrm>
+          <a:prstGeom prst="bentConnector2">
+            <a:avLst/>
+          </a:prstGeom>
+          <a:ln w="19050">
+            <a:solidFill>
+              <a:srgbClr val="1D5366"/>
+            </a:solidFill>
+            <a:headEnd type="arrow" w="med" len="med"/>
+            <a:tailEnd type="arrow" w="med" len="med"/>
+          </a:ln>
+        </p:spPr>
+        <p:style>
+          <a:lnRef idx="1">
+            <a:schemeClr val="accent1"/>
+          </a:lnRef>
+          <a:fillRef idx="0">
+            <a:schemeClr val="accent1"/>
+          </a:fillRef>
+          <a:effectRef idx="0">
+            <a:schemeClr val="accent1"/>
+          </a:effectRef>
+          <a:fontRef idx="minor">
+            <a:schemeClr val="tx1"/>
+          </a:fontRef>
+        </p:style>
+      </p:cxnSp>
+      <p:cxnSp>
+        <p:nvCxnSpPr>
+          <p:cNvPr id="108" name="Elbow Connector 107">
+            <a:extLst>
+              <a:ext uri="{FF2B5EF4-FFF2-40B4-BE49-F238E27FC236}">
+                <a16:creationId xmlns:a16="http://schemas.microsoft.com/office/drawing/2014/main" id="{B17ABF04-22AB-3F47-56F7-D13773C47EC8}"/>
+              </a:ext>
+            </a:extLst>
+          </p:cNvPr>
+          <p:cNvCxnSpPr>
+            <a:cxnSpLocks/>
+            <a:endCxn id="29" idx="2"/>
+          </p:cNvCxnSpPr>
+          <p:nvPr/>
+        </p:nvCxnSpPr>
+        <p:spPr>
+          <a:xfrm rot="16200000" flipV="1">
+            <a:off x="7355836" y="1419862"/>
+            <a:ext cx="1127588" cy="866997"/>
+          </a:xfrm>
+          <a:prstGeom prst="bentConnector3">
+            <a:avLst>
+              <a:gd name="adj1" fmla="val 50000"/>
+            </a:avLst>
+          </a:prstGeom>
+          <a:ln w="19050">
+            <a:solidFill>
+              <a:srgbClr val="1D5366"/>
+            </a:solidFill>
+            <a:headEnd type="arrow" w="med" len="med"/>
+            <a:tailEnd type="arrow" w="med" len="med"/>
+          </a:ln>
+        </p:spPr>
+        <p:style>
+          <a:lnRef idx="1">
+            <a:schemeClr val="accent1"/>
+          </a:lnRef>
+          <a:fillRef idx="0">
+            <a:schemeClr val="accent1"/>
+          </a:fillRef>
+          <a:effectRef idx="0">
+            <a:schemeClr val="accent1"/>
+          </a:effectRef>
+          <a:fontRef idx="minor">
+            <a:schemeClr val="tx1"/>
+          </a:fontRef>
+        </p:style>
+      </p:cxnSp>
+      <p:cxnSp>
+        <p:nvCxnSpPr>
+          <p:cNvPr id="111" name="Elbow Connector 110">
+            <a:extLst>
+              <a:ext uri="{FF2B5EF4-FFF2-40B4-BE49-F238E27FC236}">
+                <a16:creationId xmlns:a16="http://schemas.microsoft.com/office/drawing/2014/main" id="{B7E5E4F1-2F32-6E14-8A63-EA1EFC3CE1C7}"/>
+              </a:ext>
+            </a:extLst>
+          </p:cNvPr>
+          <p:cNvCxnSpPr>
+            <a:cxnSpLocks/>
+          </p:cNvCxnSpPr>
+          <p:nvPr/>
+        </p:nvCxnSpPr>
+        <p:spPr>
+          <a:xfrm rot="5400000" flipH="1" flipV="1">
+            <a:off x="8348609" y="1429371"/>
+            <a:ext cx="1114978" cy="851554"/>
+          </a:xfrm>
+          <a:prstGeom prst="bentConnector3">
+            <a:avLst>
+              <a:gd name="adj1" fmla="val 50000"/>
+            </a:avLst>
+          </a:prstGeom>
+          <a:ln w="19050">
+            <a:solidFill>
+              <a:srgbClr val="1D5366"/>
+            </a:solidFill>
+            <a:headEnd type="arrow" w="med" len="med"/>
+            <a:tailEnd type="arrow" w="med" len="med"/>
+          </a:ln>
+        </p:spPr>
+        <p:style>
+          <a:lnRef idx="1">
+            <a:schemeClr val="accent1"/>
+          </a:lnRef>
+          <a:fillRef idx="0">
+            <a:schemeClr val="accent1"/>
+          </a:fillRef>
+          <a:effectRef idx="0">
+            <a:schemeClr val="accent1"/>
+          </a:effectRef>
+          <a:fontRef idx="minor">
+            <a:schemeClr val="tx1"/>
+          </a:fontRef>
+        </p:style>
+      </p:cxnSp>
+      <p:cxnSp>
+        <p:nvCxnSpPr>
+          <p:cNvPr id="117" name="Elbow Connector 116">
+            <a:extLst>
+              <a:ext uri="{FF2B5EF4-FFF2-40B4-BE49-F238E27FC236}">
+                <a16:creationId xmlns:a16="http://schemas.microsoft.com/office/drawing/2014/main" id="{6AE884D2-5186-E165-9A01-546D08ACA432}"/>
+              </a:ext>
+            </a:extLst>
+          </p:cNvPr>
+          <p:cNvCxnSpPr>
+            <a:cxnSpLocks/>
+            <a:endCxn id="2" idx="3"/>
+          </p:cNvCxnSpPr>
+          <p:nvPr/>
+        </p:nvCxnSpPr>
+        <p:spPr>
+          <a:xfrm rot="10800000" flipV="1">
+            <a:off x="4825871" y="3268538"/>
+            <a:ext cx="3654450" cy="2062487"/>
+          </a:xfrm>
+          <a:prstGeom prst="bentConnector4">
+            <a:avLst>
+              <a:gd name="adj1" fmla="val -101"/>
+              <a:gd name="adj2" fmla="val 111084"/>
+            </a:avLst>
+          </a:prstGeom>
+          <a:ln w="19050">
+            <a:solidFill>
+              <a:srgbClr val="1D5366"/>
+            </a:solidFill>
+            <a:headEnd type="arrow" w="med" len="med"/>
+            <a:tailEnd type="none" w="med" len="med"/>
+          </a:ln>
+        </p:spPr>
+        <p:style>
+          <a:lnRef idx="1">
+            <a:schemeClr val="accent1"/>
+          </a:lnRef>
+          <a:fillRef idx="0">
+            <a:schemeClr val="accent1"/>
+          </a:fillRef>
+          <a:effectRef idx="0">
+            <a:schemeClr val="accent1"/>
+          </a:effectRef>
+          <a:fontRef idx="minor">
+            <a:schemeClr val="tx1"/>
+          </a:fontRef>
+        </p:style>
+      </p:cxnSp>
+      <p:sp>
+        <p:nvSpPr>
+          <p:cNvPr id="121" name="TextBox 120">
+            <a:extLst>
+              <a:ext uri="{FF2B5EF4-FFF2-40B4-BE49-F238E27FC236}">
+                <a16:creationId xmlns:a16="http://schemas.microsoft.com/office/drawing/2014/main" id="{A0424965-BAF9-D9CA-639A-4525A6F65CB6}"/>
+              </a:ext>
+            </a:extLst>
+          </p:cNvPr>
+          <p:cNvSpPr txBox="1"/>
+          <p:nvPr/>
+        </p:nvSpPr>
+        <p:spPr>
+          <a:xfrm rot="10800000" flipV="1">
+            <a:off x="6117727" y="5549582"/>
+            <a:ext cx="959247" cy="307777"/>
+          </a:xfrm>
+          <a:prstGeom prst="rect">
+            <a:avLst/>
+          </a:prstGeom>
+          <a:noFill/>
+        </p:spPr>
+        <p:txBody>
+          <a:bodyPr wrap="square" rtlCol="0">
+            <a:spAutoFit/>
+          </a:bodyPr>
+          <a:lstStyle/>
+          <a:p>
+            <a:r>
+              <a:rPr lang="en-US" sz="1400" dirty="0">
+                <a:solidFill>
+                  <a:srgbClr val="1D5366"/>
+                </a:solidFill>
+              </a:rPr>
+              <a:t>Nexus files</a:t>
+            </a:r>
+          </a:p>
+        </p:txBody>
+      </p:sp>
+      <p:sp>
+        <p:nvSpPr>
+          <p:cNvPr id="2" name="Can 1">
+            <a:extLst>
+              <a:ext uri="{FF2B5EF4-FFF2-40B4-BE49-F238E27FC236}">
+                <a16:creationId xmlns:a16="http://schemas.microsoft.com/office/drawing/2014/main" id="{BBD32AA9-2EDA-744A-576F-027619FC7633}"/>
+              </a:ext>
+            </a:extLst>
+          </p:cNvPr>
+          <p:cNvSpPr/>
+          <p:nvPr/>
+        </p:nvSpPr>
+        <p:spPr>
+          <a:xfrm>
+            <a:off x="4093286" y="4111238"/>
+            <a:ext cx="1465169" cy="1219788"/>
+          </a:xfrm>
+          <a:prstGeom prst="can">
+            <a:avLst/>
+          </a:prstGeom>
+          <a:solidFill>
+            <a:srgbClr val="1D5366"/>
+          </a:solidFill>
+          <a:ln w="19050">
+            <a:solidFill>
+              <a:srgbClr val="329BCA"/>
+            </a:solidFill>
+          </a:ln>
+        </p:spPr>
+        <p:style>
+          <a:lnRef idx="2">
+            <a:schemeClr val="accent1">
+              <a:shade val="50000"/>
+            </a:schemeClr>
+          </a:lnRef>
+          <a:fillRef idx="1">
+            <a:schemeClr val="accent1"/>
+          </a:fillRef>
+          <a:effectRef idx="0">
+            <a:schemeClr val="accent1"/>
+          </a:effectRef>
+          <a:fontRef idx="minor">
+            <a:schemeClr val="lt1"/>
+          </a:fontRef>
+        </p:style>
+        <p:txBody>
+          <a:bodyPr rtlCol="0" anchor="ctr"/>
+          <a:lstStyle/>
+          <a:p>
+            <a:pPr algn="ctr"/>
+            <a:r>
+              <a:rPr lang="en-US" sz="1600" dirty="0"/>
+              <a:t>Storage</a:t>
+            </a:r>
+          </a:p>
+          <a:p>
+            <a:pPr algn="ctr"/>
+            <a:r>
+              <a:rPr lang="en-US" sz="1600" dirty="0"/>
+              <a:t>(CEPH)</a:t>
+            </a:r>
+          </a:p>
+        </p:txBody>
+      </p:sp>
+      <p:sp>
+        <p:nvSpPr>
+          <p:cNvPr id="5" name="Rectangle 4">
+            <a:extLst>
+              <a:ext uri="{FF2B5EF4-FFF2-40B4-BE49-F238E27FC236}">
+                <a16:creationId xmlns:a16="http://schemas.microsoft.com/office/drawing/2014/main" id="{A02615F1-63C3-987B-6B89-01C2FF5C559C}"/>
+              </a:ext>
+            </a:extLst>
+          </p:cNvPr>
+          <p:cNvSpPr/>
+          <p:nvPr/>
+        </p:nvSpPr>
+        <p:spPr>
+          <a:xfrm>
+            <a:off x="3226885" y="440607"/>
+            <a:ext cx="717007" cy="579851"/>
+          </a:xfrm>
+          <a:prstGeom prst="rect">
+            <a:avLst/>
+          </a:prstGeom>
+          <a:solidFill>
+            <a:srgbClr val="97BCCA"/>
+          </a:solidFill>
+          <a:ln w="19050">
+            <a:solidFill>
+              <a:srgbClr val="1D5366"/>
+            </a:solidFill>
+          </a:ln>
+        </p:spPr>
+        <p:style>
+          <a:lnRef idx="2">
+            <a:schemeClr val="accent1">
+              <a:shade val="50000"/>
+            </a:schemeClr>
+          </a:lnRef>
+          <a:fillRef idx="1">
+            <a:schemeClr val="accent1"/>
+          </a:fillRef>
+          <a:effectRef idx="0">
+            <a:schemeClr val="accent1"/>
+          </a:effectRef>
+          <a:fontRef idx="minor">
+            <a:schemeClr val="lt1"/>
+          </a:fontRef>
+        </p:style>
+        <p:txBody>
+          <a:bodyPr rtlCol="0" anchor="ctr"/>
+          <a:lstStyle/>
+          <a:p>
+            <a:pPr algn="ctr"/>
+            <a:r>
+              <a:rPr lang="en-US" sz="1600" dirty="0"/>
+              <a:t>IOC 3</a:t>
+            </a:r>
+          </a:p>
+        </p:txBody>
+      </p:sp>
+      <p:sp>
+        <p:nvSpPr>
+          <p:cNvPr id="12" name="Rectangle 11">
+            <a:extLst>
+              <a:ext uri="{FF2B5EF4-FFF2-40B4-BE49-F238E27FC236}">
+                <a16:creationId xmlns:a16="http://schemas.microsoft.com/office/drawing/2014/main" id="{119FBAA3-F66A-3973-A539-8D40F42220A6}"/>
+              </a:ext>
+            </a:extLst>
+          </p:cNvPr>
+          <p:cNvSpPr/>
+          <p:nvPr/>
+        </p:nvSpPr>
+        <p:spPr>
+          <a:xfrm>
+            <a:off x="4235074" y="440607"/>
+            <a:ext cx="717007" cy="579851"/>
+          </a:xfrm>
+          <a:prstGeom prst="rect">
+            <a:avLst/>
+          </a:prstGeom>
+          <a:solidFill>
+            <a:srgbClr val="97BCCA"/>
+          </a:solidFill>
+          <a:ln w="19050">
+            <a:solidFill>
+              <a:srgbClr val="1D5366"/>
+            </a:solidFill>
+          </a:ln>
+        </p:spPr>
+        <p:style>
+          <a:lnRef idx="2">
+            <a:schemeClr val="accent1">
+              <a:shade val="50000"/>
+            </a:schemeClr>
+          </a:lnRef>
+          <a:fillRef idx="1">
+            <a:schemeClr val="accent1"/>
+          </a:fillRef>
+          <a:effectRef idx="0">
+            <a:schemeClr val="accent1"/>
+          </a:effectRef>
+          <a:fontRef idx="minor">
+            <a:schemeClr val="lt1"/>
+          </a:fontRef>
+        </p:style>
+        <p:txBody>
+          <a:bodyPr rtlCol="0" anchor="ctr"/>
+          <a:lstStyle/>
+          <a:p>
+            <a:pPr algn="ctr"/>
+            <a:r>
+              <a:rPr lang="en-US" sz="1600" dirty="0"/>
+              <a:t>IOC 4</a:t>
+            </a:r>
+          </a:p>
+        </p:txBody>
+      </p:sp>
+      <p:cxnSp>
+        <p:nvCxnSpPr>
+          <p:cNvPr id="13" name="Straight Connector 12">
+            <a:extLst>
+              <a:ext uri="{FF2B5EF4-FFF2-40B4-BE49-F238E27FC236}">
+                <a16:creationId xmlns:a16="http://schemas.microsoft.com/office/drawing/2014/main" id="{0D5E0270-6D1C-DCD0-DF6C-D36DA7D8DBBE}"/>
+              </a:ext>
+            </a:extLst>
+          </p:cNvPr>
+          <p:cNvCxnSpPr>
+            <a:cxnSpLocks/>
+            <a:stCxn id="5" idx="2"/>
+          </p:cNvCxnSpPr>
+          <p:nvPr/>
+        </p:nvCxnSpPr>
+        <p:spPr>
+          <a:xfrm flipH="1">
+            <a:off x="3585388" y="1020458"/>
+            <a:ext cx="1" cy="553094"/>
           </a:xfrm>
           <a:prstGeom prst="line">
             <a:avLst/>
@@ -4508,22 +4953,23 @@
       </p:cxnSp>
       <p:cxnSp>
         <p:nvCxnSpPr>
-          <p:cNvPr id="69" name="Straight Connector 68">
-            <a:extLst>
-              <a:ext uri="{FF2B5EF4-FFF2-40B4-BE49-F238E27FC236}">
-                <a16:creationId xmlns:a16="http://schemas.microsoft.com/office/drawing/2014/main" id="{F5E07363-2CEA-0864-8030-F4F1893F6292}"/>
+          <p:cNvPr id="14" name="Straight Connector 13">
+            <a:extLst>
+              <a:ext uri="{FF2B5EF4-FFF2-40B4-BE49-F238E27FC236}">
+                <a16:creationId xmlns:a16="http://schemas.microsoft.com/office/drawing/2014/main" id="{085767BB-7DEC-F4FE-2748-B26B1B8ED0FB}"/>
               </a:ext>
             </a:extLst>
           </p:cNvPr>
           <p:cNvCxnSpPr>
             <a:cxnSpLocks/>
+            <a:stCxn id="12" idx="2"/>
           </p:cNvCxnSpPr>
           <p:nvPr/>
         </p:nvCxnSpPr>
         <p:spPr>
           <a:xfrm>
-            <a:off x="4146962" y="3501642"/>
-            <a:ext cx="0" cy="471988"/>
+            <a:off x="4593578" y="1020458"/>
+            <a:ext cx="0" cy="545949"/>
           </a:xfrm>
           <a:prstGeom prst="line">
             <a:avLst/>
@@ -4547,10 +4993,10 @@
       </p:cxnSp>
       <p:sp>
         <p:nvSpPr>
-          <p:cNvPr id="70" name="TextBox 69">
-            <a:extLst>
-              <a:ext uri="{FF2B5EF4-FFF2-40B4-BE49-F238E27FC236}">
-                <a16:creationId xmlns:a16="http://schemas.microsoft.com/office/drawing/2014/main" id="{D704C1F0-C6F8-D371-9C42-4DDABA7AD49F}"/>
+          <p:cNvPr id="126" name="TextBox 125">
+            <a:extLst>
+              <a:ext uri="{FF2B5EF4-FFF2-40B4-BE49-F238E27FC236}">
+                <a16:creationId xmlns:a16="http://schemas.microsoft.com/office/drawing/2014/main" id="{EEC6468F-9194-B32F-20E3-E60CE0BFFE0F}"/>
               </a:ext>
             </a:extLst>
           </p:cNvPr>
@@ -4558,9 +5004,9 @@
           <p:nvPr/>
         </p:nvSpPr>
         <p:spPr>
-          <a:xfrm>
-            <a:off x="74141" y="3226663"/>
-            <a:ext cx="961779" cy="307777"/>
+          <a:xfrm rot="10800000" flipV="1">
+            <a:off x="9296842" y="1401471"/>
+            <a:ext cx="959247" cy="307777"/>
           </a:xfrm>
           <a:prstGeom prst="rect">
             <a:avLst/>
@@ -4574,18 +5020,100 @@
           <a:lstStyle/>
           <a:p>
             <a:r>
-              <a:rPr lang="en-US" sz="1400" dirty="0"/>
-              <a:t>PV Access</a:t>
+              <a:rPr lang="en-US" sz="1400" dirty="0">
+                <a:solidFill>
+                  <a:srgbClr val="1D5366"/>
+                </a:solidFill>
+              </a:rPr>
+              <a:t>Nexus files</a:t>
+            </a:r>
+          </a:p>
+        </p:txBody>
+      </p:sp>
+      <p:sp>
+        <p:nvSpPr>
+          <p:cNvPr id="127" name="TextBox 126">
+            <a:extLst>
+              <a:ext uri="{FF2B5EF4-FFF2-40B4-BE49-F238E27FC236}">
+                <a16:creationId xmlns:a16="http://schemas.microsoft.com/office/drawing/2014/main" id="{1DF34293-9A1A-5D5C-E0E2-FB72D07A9CC1}"/>
+              </a:ext>
+            </a:extLst>
+          </p:cNvPr>
+          <p:cNvSpPr txBox="1"/>
+          <p:nvPr/>
+        </p:nvSpPr>
+        <p:spPr>
+          <a:xfrm rot="10800000" flipV="1">
+            <a:off x="7456735" y="1401471"/>
+            <a:ext cx="959247" cy="307777"/>
+          </a:xfrm>
+          <a:prstGeom prst="rect">
+            <a:avLst/>
+          </a:prstGeom>
+          <a:noFill/>
+        </p:spPr>
+        <p:txBody>
+          <a:bodyPr wrap="square" rtlCol="0">
+            <a:spAutoFit/>
+          </a:bodyPr>
+          <a:lstStyle/>
+          <a:p>
+            <a:r>
+              <a:rPr lang="en-US" sz="1400" dirty="0">
+                <a:solidFill>
+                  <a:srgbClr val="1D5366"/>
+                </a:solidFill>
+              </a:rPr>
+              <a:t>Nexus files</a:t>
+            </a:r>
+          </a:p>
+        </p:txBody>
+      </p:sp>
+      <p:sp>
+        <p:nvSpPr>
+          <p:cNvPr id="128" name="TextBox 127">
+            <a:extLst>
+              <a:ext uri="{FF2B5EF4-FFF2-40B4-BE49-F238E27FC236}">
+                <a16:creationId xmlns:a16="http://schemas.microsoft.com/office/drawing/2014/main" id="{B3D7221B-7976-84DA-D357-D2EA23F5AF33}"/>
+              </a:ext>
+            </a:extLst>
+          </p:cNvPr>
+          <p:cNvSpPr txBox="1"/>
+          <p:nvPr/>
+        </p:nvSpPr>
+        <p:spPr>
+          <a:xfrm rot="10800000" flipV="1">
+            <a:off x="7653211" y="2048648"/>
+            <a:ext cx="959247" cy="307777"/>
+          </a:xfrm>
+          <a:prstGeom prst="rect">
+            <a:avLst/>
+          </a:prstGeom>
+          <a:noFill/>
+        </p:spPr>
+        <p:txBody>
+          <a:bodyPr wrap="square" rtlCol="0">
+            <a:spAutoFit/>
+          </a:bodyPr>
+          <a:lstStyle/>
+          <a:p>
+            <a:r>
+              <a:rPr lang="en-US" sz="1400" dirty="0">
+                <a:solidFill>
+                  <a:srgbClr val="1D5366"/>
+                </a:solidFill>
+              </a:rPr>
+              <a:t>Queries</a:t>
             </a:r>
           </a:p>
         </p:txBody>
       </p:sp>
       <p:cxnSp>
         <p:nvCxnSpPr>
-          <p:cNvPr id="71" name="Curved Connector 70">
-            <a:extLst>
-              <a:ext uri="{FF2B5EF4-FFF2-40B4-BE49-F238E27FC236}">
-                <a16:creationId xmlns:a16="http://schemas.microsoft.com/office/drawing/2014/main" id="{921876DC-D3B4-1EBB-37F8-F3B3E6E0B772}"/>
+          <p:cNvPr id="129" name="Straight Arrow Connector 128">
+            <a:extLst>
+              <a:ext uri="{FF2B5EF4-FFF2-40B4-BE49-F238E27FC236}">
+                <a16:creationId xmlns:a16="http://schemas.microsoft.com/office/drawing/2014/main" id="{934F7D6B-42DE-75EF-6E85-F867A3AB4708}"/>
               </a:ext>
             </a:extLst>
           </p:cNvPr>
@@ -4595,18 +5123,19 @@
           <p:nvPr/>
         </p:nvCxnSpPr>
         <p:spPr>
-          <a:xfrm rot="10800000" flipH="1">
-            <a:off x="3560496" y="3076299"/>
-            <a:ext cx="255682" cy="373672"/>
-          </a:xfrm>
-          <a:prstGeom prst="curvedConnector2">
+          <a:xfrm>
+            <a:off x="2352107" y="1620706"/>
+            <a:ext cx="0" cy="796449"/>
+          </a:xfrm>
+          <a:prstGeom prst="straightConnector1">
             <a:avLst/>
           </a:prstGeom>
           <a:ln w="19050">
             <a:solidFill>
               <a:srgbClr val="C00000"/>
             </a:solidFill>
-            <a:tailEnd type="triangle"/>
+            <a:headEnd type="none" w="med" len="med"/>
+            <a:tailEnd type="arrow" w="med" len="med"/>
           </a:ln>
         </p:spPr>
         <p:style>
@@ -4626,10 +5155,10 @@
       </p:cxnSp>
       <p:cxnSp>
         <p:nvCxnSpPr>
-          <p:cNvPr id="72" name="Curved Connector 71">
-            <a:extLst>
-              <a:ext uri="{FF2B5EF4-FFF2-40B4-BE49-F238E27FC236}">
-                <a16:creationId xmlns:a16="http://schemas.microsoft.com/office/drawing/2014/main" id="{D041D7AD-4F42-C15A-38F6-3439306AF8AA}"/>
+          <p:cNvPr id="130" name="Straight Arrow Connector 129">
+            <a:extLst>
+              <a:ext uri="{FF2B5EF4-FFF2-40B4-BE49-F238E27FC236}">
+                <a16:creationId xmlns:a16="http://schemas.microsoft.com/office/drawing/2014/main" id="{FE7D13A3-0ADF-F68C-7CD5-FECA895DD75A}"/>
               </a:ext>
             </a:extLst>
           </p:cNvPr>
@@ -4639,18 +5168,19 @@
           <p:nvPr/>
         </p:nvCxnSpPr>
         <p:spPr>
-          <a:xfrm rot="10800000" flipH="1" flipV="1">
-            <a:off x="3816178" y="3587309"/>
-            <a:ext cx="255682" cy="373672"/>
-          </a:xfrm>
-          <a:prstGeom prst="curvedConnector2">
+          <a:xfrm>
+            <a:off x="2440445" y="1620706"/>
+            <a:ext cx="0" cy="796449"/>
+          </a:xfrm>
+          <a:prstGeom prst="straightConnector1">
             <a:avLst/>
           </a:prstGeom>
           <a:ln w="19050">
             <a:solidFill>
-              <a:srgbClr val="00B050"/>
+              <a:srgbClr val="C00000"/>
             </a:solidFill>
-            <a:tailEnd type="triangle"/>
+            <a:headEnd type="none" w="med" len="med"/>
+            <a:tailEnd type="arrow" w="med" len="med"/>
           </a:ln>
         </p:spPr>
         <p:style>
@@ -4670,10 +5200,10 @@
       </p:cxnSp>
       <p:cxnSp>
         <p:nvCxnSpPr>
-          <p:cNvPr id="74" name="Curved Connector 73">
-            <a:extLst>
-              <a:ext uri="{FF2B5EF4-FFF2-40B4-BE49-F238E27FC236}">
-                <a16:creationId xmlns:a16="http://schemas.microsoft.com/office/drawing/2014/main" id="{68E59247-FEF7-FD04-FCB8-3621D2A693C8}"/>
+          <p:cNvPr id="131" name="Straight Arrow Connector 130">
+            <a:extLst>
+              <a:ext uri="{FF2B5EF4-FFF2-40B4-BE49-F238E27FC236}">
+                <a16:creationId xmlns:a16="http://schemas.microsoft.com/office/drawing/2014/main" id="{E12B36B5-118E-BA57-CA78-EE3CF70D25EE}"/>
               </a:ext>
             </a:extLst>
           </p:cNvPr>
@@ -4683,18 +5213,520 @@
           <p:nvPr/>
         </p:nvCxnSpPr>
         <p:spPr>
-          <a:xfrm flipV="1">
-            <a:off x="4673142" y="2902846"/>
-            <a:ext cx="1101443" cy="1398747"/>
+          <a:xfrm>
+            <a:off x="4052583" y="1620706"/>
+            <a:ext cx="0" cy="796449"/>
+          </a:xfrm>
+          <a:prstGeom prst="straightConnector1">
+            <a:avLst/>
+          </a:prstGeom>
+          <a:ln w="19050">
+            <a:solidFill>
+              <a:srgbClr val="00B050"/>
+            </a:solidFill>
+            <a:headEnd type="none" w="med" len="med"/>
+            <a:tailEnd type="arrow" w="med" len="med"/>
+          </a:ln>
+        </p:spPr>
+        <p:style>
+          <a:lnRef idx="1">
+            <a:schemeClr val="accent1"/>
+          </a:lnRef>
+          <a:fillRef idx="0">
+            <a:schemeClr val="accent1"/>
+          </a:fillRef>
+          <a:effectRef idx="0">
+            <a:schemeClr val="accent1"/>
+          </a:effectRef>
+          <a:fontRef idx="minor">
+            <a:schemeClr val="tx1"/>
+          </a:fontRef>
+        </p:style>
+      </p:cxnSp>
+      <p:sp>
+        <p:nvSpPr>
+          <p:cNvPr id="133" name="TextBox 132">
+            <a:extLst>
+              <a:ext uri="{FF2B5EF4-FFF2-40B4-BE49-F238E27FC236}">
+                <a16:creationId xmlns:a16="http://schemas.microsoft.com/office/drawing/2014/main" id="{F818A88F-3A21-A750-1072-B4B66303BA7C}"/>
+              </a:ext>
+            </a:extLst>
+          </p:cNvPr>
+          <p:cNvSpPr txBox="1"/>
+          <p:nvPr/>
+        </p:nvSpPr>
+        <p:spPr>
+          <a:xfrm rot="10800000" flipV="1">
+            <a:off x="9483289" y="2644009"/>
+            <a:ext cx="1880892" cy="400110"/>
+          </a:xfrm>
+          <a:prstGeom prst="rect">
+            <a:avLst/>
+          </a:prstGeom>
+          <a:noFill/>
+        </p:spPr>
+        <p:txBody>
+          <a:bodyPr wrap="square" rtlCol="0">
+            <a:spAutoFit/>
+          </a:bodyPr>
+          <a:lstStyle/>
+          <a:p>
+            <a:pPr algn="r"/>
+            <a:r>
+              <a:rPr lang="en-US" sz="2000" dirty="0">
+                <a:ln>
+                  <a:solidFill>
+                    <a:srgbClr val="329BCA"/>
+                  </a:solidFill>
+                </a:ln>
+                <a:solidFill>
+                  <a:srgbClr val="1D5366"/>
+                </a:solidFill>
+              </a:rPr>
+              <a:t>SDS services</a:t>
+            </a:r>
+          </a:p>
+        </p:txBody>
+      </p:sp>
+      <p:sp>
+        <p:nvSpPr>
+          <p:cNvPr id="134" name="TextBox 133">
+            <a:extLst>
+              <a:ext uri="{FF2B5EF4-FFF2-40B4-BE49-F238E27FC236}">
+                <a16:creationId xmlns:a16="http://schemas.microsoft.com/office/drawing/2014/main" id="{56392F89-D2F0-E5C9-3B97-6C67E7F7ACD9}"/>
+              </a:ext>
+            </a:extLst>
+          </p:cNvPr>
+          <p:cNvSpPr txBox="1"/>
+          <p:nvPr/>
+        </p:nvSpPr>
+        <p:spPr>
+          <a:xfrm rot="10800000" flipV="1">
+            <a:off x="9355081" y="4367189"/>
+            <a:ext cx="2009100" cy="707886"/>
+          </a:xfrm>
+          <a:prstGeom prst="rect">
+            <a:avLst/>
+          </a:prstGeom>
+          <a:noFill/>
+        </p:spPr>
+        <p:txBody>
+          <a:bodyPr wrap="square" rtlCol="0">
+            <a:spAutoFit/>
+          </a:bodyPr>
+          <a:lstStyle/>
+          <a:p>
+            <a:pPr algn="r"/>
+            <a:r>
+              <a:rPr lang="en-US" sz="2000" dirty="0">
+                <a:ln>
+                  <a:solidFill>
+                    <a:srgbClr val="329BCA"/>
+                  </a:solidFill>
+                </a:ln>
+                <a:solidFill>
+                  <a:srgbClr val="1D5366"/>
+                </a:solidFill>
+              </a:rPr>
+              <a:t>Storage and indexing backend</a:t>
+            </a:r>
+          </a:p>
+        </p:txBody>
+      </p:sp>
+      <p:sp>
+        <p:nvSpPr>
+          <p:cNvPr id="136" name="TextBox 135">
+            <a:extLst>
+              <a:ext uri="{FF2B5EF4-FFF2-40B4-BE49-F238E27FC236}">
+                <a16:creationId xmlns:a16="http://schemas.microsoft.com/office/drawing/2014/main" id="{71261128-7DEE-6F4D-0198-099BE7E968AE}"/>
+              </a:ext>
+            </a:extLst>
+          </p:cNvPr>
+          <p:cNvSpPr txBox="1"/>
+          <p:nvPr/>
+        </p:nvSpPr>
+        <p:spPr>
+          <a:xfrm rot="10800000" flipV="1">
+            <a:off x="10093958" y="665032"/>
+            <a:ext cx="1270223" cy="400110"/>
+          </a:xfrm>
+          <a:prstGeom prst="rect">
+            <a:avLst/>
+          </a:prstGeom>
+          <a:noFill/>
+        </p:spPr>
+        <p:txBody>
+          <a:bodyPr wrap="square" rtlCol="0">
+            <a:spAutoFit/>
+          </a:bodyPr>
+          <a:lstStyle/>
+          <a:p>
+            <a:pPr algn="r"/>
+            <a:r>
+              <a:rPr lang="en-US" sz="2000" dirty="0">
+                <a:ln>
+                  <a:solidFill>
+                    <a:srgbClr val="329BCA"/>
+                  </a:solidFill>
+                </a:ln>
+                <a:solidFill>
+                  <a:srgbClr val="1D5366"/>
+                </a:solidFill>
+              </a:rPr>
+              <a:t>Clients</a:t>
+            </a:r>
+          </a:p>
+        </p:txBody>
+      </p:sp>
+      <p:sp>
+        <p:nvSpPr>
+          <p:cNvPr id="139" name="TextBox 138">
+            <a:extLst>
+              <a:ext uri="{FF2B5EF4-FFF2-40B4-BE49-F238E27FC236}">
+                <a16:creationId xmlns:a16="http://schemas.microsoft.com/office/drawing/2014/main" id="{F49B66F2-4B2A-CE1A-9125-651941935E21}"/>
+              </a:ext>
+            </a:extLst>
+          </p:cNvPr>
+          <p:cNvSpPr txBox="1"/>
+          <p:nvPr/>
+        </p:nvSpPr>
+        <p:spPr>
+          <a:xfrm rot="10800000" flipV="1">
+            <a:off x="2405823" y="1679106"/>
+            <a:ext cx="910510" cy="276999"/>
+          </a:xfrm>
+          <a:prstGeom prst="rect">
+            <a:avLst/>
+          </a:prstGeom>
+          <a:noFill/>
+        </p:spPr>
+        <p:txBody>
+          <a:bodyPr wrap="square" rtlCol="0">
+            <a:spAutoFit/>
+          </a:bodyPr>
+          <a:lstStyle/>
+          <a:p>
+            <a:r>
+              <a:rPr lang="en-US" sz="1200" dirty="0">
+                <a:solidFill>
+                  <a:srgbClr val="C00000"/>
+                </a:solidFill>
+              </a:rPr>
+              <a:t>New data</a:t>
+            </a:r>
+          </a:p>
+        </p:txBody>
+      </p:sp>
+      <p:sp>
+        <p:nvSpPr>
+          <p:cNvPr id="152" name="TextBox 151">
+            <a:extLst>
+              <a:ext uri="{FF2B5EF4-FFF2-40B4-BE49-F238E27FC236}">
+                <a16:creationId xmlns:a16="http://schemas.microsoft.com/office/drawing/2014/main" id="{26DDF289-C146-7CBB-6201-E605410A725E}"/>
+              </a:ext>
+            </a:extLst>
+          </p:cNvPr>
+          <p:cNvSpPr txBox="1"/>
+          <p:nvPr/>
+        </p:nvSpPr>
+        <p:spPr>
+          <a:xfrm rot="10800000" flipV="1">
+            <a:off x="4041571" y="1679105"/>
+            <a:ext cx="910510" cy="276999"/>
+          </a:xfrm>
+          <a:prstGeom prst="rect">
+            <a:avLst/>
+          </a:prstGeom>
+          <a:noFill/>
+        </p:spPr>
+        <p:txBody>
+          <a:bodyPr wrap="square" rtlCol="0">
+            <a:spAutoFit/>
+          </a:bodyPr>
+          <a:lstStyle/>
+          <a:p>
+            <a:r>
+              <a:rPr lang="en-US" sz="1200" dirty="0">
+                <a:solidFill>
+                  <a:srgbClr val="00B050"/>
+                </a:solidFill>
+              </a:rPr>
+              <a:t>New data</a:t>
+            </a:r>
+          </a:p>
+        </p:txBody>
+      </p:sp>
+      <p:sp>
+        <p:nvSpPr>
+          <p:cNvPr id="28" name="Rectangle 27">
+            <a:extLst>
+              <a:ext uri="{FF2B5EF4-FFF2-40B4-BE49-F238E27FC236}">
+                <a16:creationId xmlns:a16="http://schemas.microsoft.com/office/drawing/2014/main" id="{235E3F9B-0A07-328C-5AEE-5D803EE5DA1C}"/>
+              </a:ext>
+            </a:extLst>
+          </p:cNvPr>
+          <p:cNvSpPr/>
+          <p:nvPr/>
+        </p:nvSpPr>
+        <p:spPr>
+          <a:xfrm>
+            <a:off x="7757499" y="2419583"/>
+            <a:ext cx="1270223" cy="848960"/>
+          </a:xfrm>
+          <a:prstGeom prst="rect">
+            <a:avLst/>
+          </a:prstGeom>
+          <a:solidFill>
+            <a:srgbClr val="329BCA"/>
+          </a:solidFill>
+          <a:ln w="19050">
+            <a:solidFill>
+              <a:srgbClr val="1D5366"/>
+            </a:solidFill>
+          </a:ln>
+        </p:spPr>
+        <p:style>
+          <a:lnRef idx="2">
+            <a:schemeClr val="accent1">
+              <a:shade val="50000"/>
+            </a:schemeClr>
+          </a:lnRef>
+          <a:fillRef idx="1">
+            <a:schemeClr val="accent1"/>
+          </a:fillRef>
+          <a:effectRef idx="0">
+            <a:schemeClr val="accent1"/>
+          </a:effectRef>
+          <a:fontRef idx="minor">
+            <a:schemeClr val="lt1"/>
+          </a:fontRef>
+        </p:style>
+        <p:txBody>
+          <a:bodyPr rtlCol="0" anchor="ctr"/>
+          <a:lstStyle/>
+          <a:p>
+            <a:pPr algn="ctr"/>
+            <a:r>
+              <a:rPr lang="en-US" sz="1600" dirty="0"/>
+              <a:t>Data retriever</a:t>
+            </a:r>
+          </a:p>
+          <a:p>
+            <a:pPr algn="ctr"/>
+            <a:r>
+              <a:rPr lang="en-US" sz="1600" dirty="0"/>
+              <a:t>service</a:t>
+            </a:r>
+          </a:p>
+        </p:txBody>
+      </p:sp>
+      <p:sp>
+        <p:nvSpPr>
+          <p:cNvPr id="3" name="Rectangle 2">
+            <a:extLst>
+              <a:ext uri="{FF2B5EF4-FFF2-40B4-BE49-F238E27FC236}">
+                <a16:creationId xmlns:a16="http://schemas.microsoft.com/office/drawing/2014/main" id="{1A4D9AE5-7046-4FF9-1AA7-B473485A21E7}"/>
+              </a:ext>
+            </a:extLst>
+          </p:cNvPr>
+          <p:cNvSpPr/>
+          <p:nvPr/>
+        </p:nvSpPr>
+        <p:spPr>
+          <a:xfrm>
+            <a:off x="5476265" y="2458172"/>
+            <a:ext cx="1270223" cy="771782"/>
+          </a:xfrm>
+          <a:prstGeom prst="rect">
+            <a:avLst/>
+          </a:prstGeom>
+          <a:solidFill>
+            <a:srgbClr val="329BCA"/>
+          </a:solidFill>
+          <a:ln w="19050">
+            <a:solidFill>
+              <a:srgbClr val="1D5366"/>
+            </a:solidFill>
+          </a:ln>
+        </p:spPr>
+        <p:style>
+          <a:lnRef idx="2">
+            <a:schemeClr val="accent1">
+              <a:shade val="50000"/>
+            </a:schemeClr>
+          </a:lnRef>
+          <a:fillRef idx="1">
+            <a:schemeClr val="accent1"/>
+          </a:fillRef>
+          <a:effectRef idx="0">
+            <a:schemeClr val="accent1"/>
+          </a:effectRef>
+          <a:fontRef idx="minor">
+            <a:schemeClr val="lt1"/>
+          </a:fontRef>
+        </p:style>
+        <p:txBody>
+          <a:bodyPr rtlCol="0" anchor="ctr"/>
+          <a:lstStyle/>
+          <a:p>
+            <a:pPr algn="ctr"/>
+            <a:r>
+              <a:rPr lang="en-US" sz="1600" dirty="0"/>
+              <a:t>Indexer</a:t>
+            </a:r>
+          </a:p>
+          <a:p>
+            <a:pPr algn="ctr"/>
+            <a:r>
+              <a:rPr lang="en-US" sz="1600" dirty="0"/>
+              <a:t>service</a:t>
+            </a:r>
+          </a:p>
+        </p:txBody>
+      </p:sp>
+      <p:sp>
+        <p:nvSpPr>
+          <p:cNvPr id="9" name="Rectangle 8">
+            <a:extLst>
+              <a:ext uri="{FF2B5EF4-FFF2-40B4-BE49-F238E27FC236}">
+                <a16:creationId xmlns:a16="http://schemas.microsoft.com/office/drawing/2014/main" id="{D9AD703A-2204-0211-3F9C-11FB25292466}"/>
+              </a:ext>
+            </a:extLst>
+          </p:cNvPr>
+          <p:cNvSpPr/>
+          <p:nvPr/>
+        </p:nvSpPr>
+        <p:spPr>
+          <a:xfrm>
+            <a:off x="1538294" y="2458172"/>
+            <a:ext cx="1270223" cy="771782"/>
+          </a:xfrm>
+          <a:prstGeom prst="rect">
+            <a:avLst/>
+          </a:prstGeom>
+          <a:solidFill>
+            <a:srgbClr val="329BCA"/>
+          </a:solidFill>
+          <a:ln w="19050">
+            <a:solidFill>
+              <a:srgbClr val="1D5366"/>
+            </a:solidFill>
+          </a:ln>
+        </p:spPr>
+        <p:style>
+          <a:lnRef idx="2">
+            <a:schemeClr val="accent1">
+              <a:shade val="50000"/>
+            </a:schemeClr>
+          </a:lnRef>
+          <a:fillRef idx="1">
+            <a:schemeClr val="accent1"/>
+          </a:fillRef>
+          <a:effectRef idx="0">
+            <a:schemeClr val="accent1"/>
+          </a:effectRef>
+          <a:fontRef idx="minor">
+            <a:schemeClr val="lt1"/>
+          </a:fontRef>
+        </p:style>
+        <p:txBody>
+          <a:bodyPr rtlCol="0" anchor="ctr"/>
+          <a:lstStyle/>
+          <a:p>
+            <a:pPr algn="ctr"/>
+            <a:r>
+              <a:rPr lang="en-US" sz="1600" dirty="0"/>
+              <a:t>Collector service 1</a:t>
+            </a:r>
+          </a:p>
+        </p:txBody>
+      </p:sp>
+      <p:sp>
+        <p:nvSpPr>
+          <p:cNvPr id="10" name="Rectangle 9">
+            <a:extLst>
+              <a:ext uri="{FF2B5EF4-FFF2-40B4-BE49-F238E27FC236}">
+                <a16:creationId xmlns:a16="http://schemas.microsoft.com/office/drawing/2014/main" id="{982E3BBB-7638-D217-1ED2-47938B0F9B83}"/>
+              </a:ext>
+            </a:extLst>
+          </p:cNvPr>
+          <p:cNvSpPr/>
+          <p:nvPr/>
+        </p:nvSpPr>
+        <p:spPr>
+          <a:xfrm>
+            <a:off x="3195031" y="2458172"/>
+            <a:ext cx="1270223" cy="771782"/>
+          </a:xfrm>
+          <a:prstGeom prst="rect">
+            <a:avLst/>
+          </a:prstGeom>
+          <a:solidFill>
+            <a:srgbClr val="329BCA"/>
+          </a:solidFill>
+          <a:ln w="19050">
+            <a:solidFill>
+              <a:srgbClr val="1D5366"/>
+            </a:solidFill>
+          </a:ln>
+        </p:spPr>
+        <p:style>
+          <a:lnRef idx="2">
+            <a:schemeClr val="accent1">
+              <a:shade val="50000"/>
+            </a:schemeClr>
+          </a:lnRef>
+          <a:fillRef idx="1">
+            <a:schemeClr val="accent1"/>
+          </a:fillRef>
+          <a:effectRef idx="0">
+            <a:schemeClr val="accent1"/>
+          </a:effectRef>
+          <a:fontRef idx="minor">
+            <a:schemeClr val="lt1"/>
+          </a:fontRef>
+        </p:style>
+        <p:txBody>
+          <a:bodyPr rtlCol="0" anchor="ctr"/>
+          <a:lstStyle/>
+          <a:p>
+            <a:pPr algn="ctr"/>
+            <a:r>
+              <a:rPr lang="en-US" sz="1600" dirty="0"/>
+              <a:t>Collector service 2</a:t>
+            </a:r>
+          </a:p>
+        </p:txBody>
+      </p:sp>
+      <p:cxnSp>
+        <p:nvCxnSpPr>
+          <p:cNvPr id="15" name="Elbow Connector 14">
+            <a:extLst>
+              <a:ext uri="{FF2B5EF4-FFF2-40B4-BE49-F238E27FC236}">
+                <a16:creationId xmlns:a16="http://schemas.microsoft.com/office/drawing/2014/main" id="{6316F7AF-35E3-2C9F-D549-78414A66F034}"/>
+              </a:ext>
+            </a:extLst>
+          </p:cNvPr>
+          <p:cNvCxnSpPr>
+            <a:cxnSpLocks/>
+            <a:stCxn id="9" idx="2"/>
+            <a:endCxn id="3" idx="2"/>
+          </p:cNvCxnSpPr>
+          <p:nvPr/>
+        </p:nvCxnSpPr>
+        <p:spPr>
+          <a:xfrm rot="16200000" flipH="1">
+            <a:off x="4142391" y="1260968"/>
+            <a:ext cx="12700" cy="3937971"/>
           </a:xfrm>
           <a:prstGeom prst="bentConnector3">
             <a:avLst>
-              <a:gd name="adj1" fmla="val 83656"/>
+              <a:gd name="adj1" fmla="val 1800000"/>
             </a:avLst>
           </a:prstGeom>
-          <a:ln w="28575">
+          <a:ln w="19050">
             <a:solidFill>
-              <a:srgbClr val="1D5366"/>
+              <a:srgbClr val="329BCA"/>
             </a:solidFill>
             <a:headEnd type="none" w="med" len="med"/>
             <a:tailEnd type="arrow" w="med" len="med"/>
@@ -4717,29 +5749,30 @@
       </p:cxnSp>
       <p:cxnSp>
         <p:nvCxnSpPr>
-          <p:cNvPr id="75" name="Curved Connector 74">
-            <a:extLst>
-              <a:ext uri="{FF2B5EF4-FFF2-40B4-BE49-F238E27FC236}">
-                <a16:creationId xmlns:a16="http://schemas.microsoft.com/office/drawing/2014/main" id="{34E68CEA-3D0E-F424-15F7-F345913ECB96}"/>
+          <p:cNvPr id="40" name="Straight Arrow Connector 39">
+            <a:extLst>
+              <a:ext uri="{FF2B5EF4-FFF2-40B4-BE49-F238E27FC236}">
+                <a16:creationId xmlns:a16="http://schemas.microsoft.com/office/drawing/2014/main" id="{2BCE5090-8116-4CE1-3172-F7E555D8EC8F}"/>
               </a:ext>
             </a:extLst>
           </p:cNvPr>
           <p:cNvCxnSpPr>
-            <a:cxnSpLocks/>
+            <a:stCxn id="10" idx="3"/>
+            <a:endCxn id="3" idx="1"/>
           </p:cNvCxnSpPr>
           <p:nvPr/>
         </p:nvCxnSpPr>
         <p:spPr>
           <a:xfrm>
-            <a:off x="4673142" y="4445673"/>
-            <a:ext cx="1385787" cy="8444"/>
+            <a:off x="4465254" y="2844063"/>
+            <a:ext cx="1011011" cy="0"/>
           </a:xfrm>
           <a:prstGeom prst="straightConnector1">
             <a:avLst/>
           </a:prstGeom>
-          <a:ln w="28575">
+          <a:ln w="19050">
             <a:solidFill>
-              <a:srgbClr val="1D5366"/>
+              <a:srgbClr val="329BCA"/>
             </a:solidFill>
             <a:headEnd type="none" w="med" len="med"/>
             <a:tailEnd type="arrow" w="med" len="med"/>
@@ -4760,942 +5793,6 @@
           </a:fontRef>
         </p:style>
       </p:cxnSp>
-      <p:cxnSp>
-        <p:nvCxnSpPr>
-          <p:cNvPr id="79" name="Curved Connector 73">
-            <a:extLst>
-              <a:ext uri="{FF2B5EF4-FFF2-40B4-BE49-F238E27FC236}">
-                <a16:creationId xmlns:a16="http://schemas.microsoft.com/office/drawing/2014/main" id="{B3B9E5A4-4719-194E-7396-961D4CADFB6A}"/>
-              </a:ext>
-            </a:extLst>
-          </p:cNvPr>
-          <p:cNvCxnSpPr>
-            <a:cxnSpLocks/>
-          </p:cNvCxnSpPr>
-          <p:nvPr/>
-        </p:nvCxnSpPr>
-        <p:spPr>
-          <a:xfrm>
-            <a:off x="4673142" y="2580066"/>
-            <a:ext cx="1098822" cy="4121"/>
-          </a:xfrm>
-          <a:prstGeom prst="straightConnector1">
-            <a:avLst/>
-          </a:prstGeom>
-          <a:ln w="28575">
-            <a:solidFill>
-              <a:srgbClr val="1D5366"/>
-            </a:solidFill>
-            <a:headEnd type="none" w="med" len="med"/>
-            <a:tailEnd type="arrow" w="med" len="med"/>
-          </a:ln>
-        </p:spPr>
-        <p:style>
-          <a:lnRef idx="1">
-            <a:schemeClr val="accent1"/>
-          </a:lnRef>
-          <a:fillRef idx="0">
-            <a:schemeClr val="accent1"/>
-          </a:fillRef>
-          <a:effectRef idx="0">
-            <a:schemeClr val="accent1"/>
-          </a:effectRef>
-          <a:fontRef idx="minor">
-            <a:schemeClr val="tx1"/>
-          </a:fontRef>
-        </p:style>
-      </p:cxnSp>
-      <p:cxnSp>
-        <p:nvCxnSpPr>
-          <p:cNvPr id="82" name="Curved Connector 74">
-            <a:extLst>
-              <a:ext uri="{FF2B5EF4-FFF2-40B4-BE49-F238E27FC236}">
-                <a16:creationId xmlns:a16="http://schemas.microsoft.com/office/drawing/2014/main" id="{B604C72A-09AD-35BD-214D-46A377FEC535}"/>
-              </a:ext>
-            </a:extLst>
-          </p:cNvPr>
-          <p:cNvCxnSpPr>
-            <a:cxnSpLocks/>
-          </p:cNvCxnSpPr>
-          <p:nvPr/>
-        </p:nvCxnSpPr>
-        <p:spPr>
-          <a:xfrm>
-            <a:off x="4673142" y="2729300"/>
-            <a:ext cx="1357637" cy="1303609"/>
-          </a:xfrm>
-          <a:prstGeom prst="bentConnector3">
-            <a:avLst>
-              <a:gd name="adj1" fmla="val 58192"/>
-            </a:avLst>
-          </a:prstGeom>
-          <a:ln w="28575">
-            <a:solidFill>
-              <a:srgbClr val="1D5366"/>
-            </a:solidFill>
-            <a:headEnd type="none" w="med" len="med"/>
-            <a:tailEnd type="arrow" w="med" len="med"/>
-          </a:ln>
-        </p:spPr>
-        <p:style>
-          <a:lnRef idx="1">
-            <a:schemeClr val="accent1"/>
-          </a:lnRef>
-          <a:fillRef idx="0">
-            <a:schemeClr val="accent1"/>
-          </a:fillRef>
-          <a:effectRef idx="0">
-            <a:schemeClr val="accent1"/>
-          </a:effectRef>
-          <a:fontRef idx="minor">
-            <a:schemeClr val="tx1"/>
-          </a:fontRef>
-        </p:style>
-      </p:cxnSp>
-      <p:sp>
-        <p:nvSpPr>
-          <p:cNvPr id="85" name="TextBox 84">
-            <a:extLst>
-              <a:ext uri="{FF2B5EF4-FFF2-40B4-BE49-F238E27FC236}">
-                <a16:creationId xmlns:a16="http://schemas.microsoft.com/office/drawing/2014/main" id="{5BDBD8EC-85E9-E11D-C0E8-65553873BD73}"/>
-              </a:ext>
-            </a:extLst>
-          </p:cNvPr>
-          <p:cNvSpPr txBox="1"/>
-          <p:nvPr/>
-        </p:nvSpPr>
-        <p:spPr>
-          <a:xfrm>
-            <a:off x="4618132" y="2740806"/>
-            <a:ext cx="1118824" cy="307777"/>
-          </a:xfrm>
-          <a:prstGeom prst="rect">
-            <a:avLst/>
-          </a:prstGeom>
-          <a:noFill/>
-        </p:spPr>
-        <p:txBody>
-          <a:bodyPr wrap="square" rtlCol="0">
-            <a:spAutoFit/>
-          </a:bodyPr>
-          <a:lstStyle/>
-          <a:p>
-            <a:r>
-              <a:rPr lang="en-US" sz="1400" dirty="0" err="1">
-                <a:solidFill>
-                  <a:srgbClr val="1D5366"/>
-                </a:solidFill>
-              </a:rPr>
-              <a:t>NeXus</a:t>
-            </a:r>
-            <a:r>
-              <a:rPr lang="en-US" sz="1400" dirty="0">
-                <a:solidFill>
-                  <a:srgbClr val="1D5366"/>
-                </a:solidFill>
-              </a:rPr>
-              <a:t> file</a:t>
-            </a:r>
-          </a:p>
-        </p:txBody>
-      </p:sp>
-      <p:sp>
-        <p:nvSpPr>
-          <p:cNvPr id="86" name="TextBox 85">
-            <a:extLst>
-              <a:ext uri="{FF2B5EF4-FFF2-40B4-BE49-F238E27FC236}">
-                <a16:creationId xmlns:a16="http://schemas.microsoft.com/office/drawing/2014/main" id="{A4301716-A0B5-B04C-9879-2AEDFB094941}"/>
-              </a:ext>
-            </a:extLst>
-          </p:cNvPr>
-          <p:cNvSpPr txBox="1"/>
-          <p:nvPr/>
-        </p:nvSpPr>
-        <p:spPr>
-          <a:xfrm>
-            <a:off x="4631450" y="4038844"/>
-            <a:ext cx="959247" cy="307777"/>
-          </a:xfrm>
-          <a:prstGeom prst="rect">
-            <a:avLst/>
-          </a:prstGeom>
-          <a:noFill/>
-        </p:spPr>
-        <p:txBody>
-          <a:bodyPr wrap="square" rtlCol="0">
-            <a:spAutoFit/>
-          </a:bodyPr>
-          <a:lstStyle/>
-          <a:p>
-            <a:r>
-              <a:rPr lang="en-US" sz="1400" dirty="0">
-                <a:solidFill>
-                  <a:srgbClr val="1D5366"/>
-                </a:solidFill>
-              </a:rPr>
-              <a:t>Metadata</a:t>
-            </a:r>
-          </a:p>
-        </p:txBody>
-      </p:sp>
-      <p:sp>
-        <p:nvSpPr>
-          <p:cNvPr id="87" name="TextBox 86">
-            <a:extLst>
-              <a:ext uri="{FF2B5EF4-FFF2-40B4-BE49-F238E27FC236}">
-                <a16:creationId xmlns:a16="http://schemas.microsoft.com/office/drawing/2014/main" id="{A9694232-2A29-58AD-7514-BD5294F59400}"/>
-              </a:ext>
-            </a:extLst>
-          </p:cNvPr>
-          <p:cNvSpPr txBox="1"/>
-          <p:nvPr/>
-        </p:nvSpPr>
-        <p:spPr>
-          <a:xfrm>
-            <a:off x="4788882" y="2300592"/>
-            <a:ext cx="959247" cy="307777"/>
-          </a:xfrm>
-          <a:prstGeom prst="rect">
-            <a:avLst/>
-          </a:prstGeom>
-          <a:noFill/>
-        </p:spPr>
-        <p:txBody>
-          <a:bodyPr wrap="square" rtlCol="0">
-            <a:spAutoFit/>
-          </a:bodyPr>
-          <a:lstStyle/>
-          <a:p>
-            <a:r>
-              <a:rPr lang="en-US" sz="1400" dirty="0">
-                <a:solidFill>
-                  <a:srgbClr val="1D5366"/>
-                </a:solidFill>
-              </a:rPr>
-              <a:t>Metadata</a:t>
-            </a:r>
-          </a:p>
-        </p:txBody>
-      </p:sp>
-      <p:sp>
-        <p:nvSpPr>
-          <p:cNvPr id="88" name="TextBox 87">
-            <a:extLst>
-              <a:ext uri="{FF2B5EF4-FFF2-40B4-BE49-F238E27FC236}">
-                <a16:creationId xmlns:a16="http://schemas.microsoft.com/office/drawing/2014/main" id="{A2DE3BDE-6D09-5B48-994F-5C54DCB1E457}"/>
-              </a:ext>
-            </a:extLst>
-          </p:cNvPr>
-          <p:cNvSpPr txBox="1"/>
-          <p:nvPr/>
-        </p:nvSpPr>
-        <p:spPr>
-          <a:xfrm>
-            <a:off x="4836256" y="4415110"/>
-            <a:ext cx="919705" cy="307777"/>
-          </a:xfrm>
-          <a:prstGeom prst="rect">
-            <a:avLst/>
-          </a:prstGeom>
-          <a:noFill/>
-        </p:spPr>
-        <p:txBody>
-          <a:bodyPr wrap="square" rtlCol="0">
-            <a:spAutoFit/>
-          </a:bodyPr>
-          <a:lstStyle/>
-          <a:p>
-            <a:r>
-              <a:rPr lang="en-US" sz="1400" dirty="0" err="1">
-                <a:solidFill>
-                  <a:srgbClr val="1D5366"/>
-                </a:solidFill>
-              </a:rPr>
-              <a:t>NeXus</a:t>
-            </a:r>
-            <a:r>
-              <a:rPr lang="en-US" sz="1400" dirty="0">
-                <a:solidFill>
-                  <a:srgbClr val="1D5366"/>
-                </a:solidFill>
-              </a:rPr>
-              <a:t> file</a:t>
-            </a:r>
-          </a:p>
-        </p:txBody>
-      </p:sp>
-      <p:cxnSp>
-        <p:nvCxnSpPr>
-          <p:cNvPr id="119" name="Curved Connector 74">
-            <a:extLst>
-              <a:ext uri="{FF2B5EF4-FFF2-40B4-BE49-F238E27FC236}">
-                <a16:creationId xmlns:a16="http://schemas.microsoft.com/office/drawing/2014/main" id="{FFF7F939-F25C-8F8F-0C70-EE2CC770487C}"/>
-              </a:ext>
-            </a:extLst>
-          </p:cNvPr>
-          <p:cNvCxnSpPr>
-            <a:cxnSpLocks/>
-          </p:cNvCxnSpPr>
-          <p:nvPr/>
-        </p:nvCxnSpPr>
-        <p:spPr>
-          <a:xfrm flipH="1" flipV="1">
-            <a:off x="7169930" y="2654206"/>
-            <a:ext cx="1159374" cy="422093"/>
-          </a:xfrm>
-          <a:prstGeom prst="straightConnector1">
-            <a:avLst/>
-          </a:prstGeom>
-          <a:ln w="28575">
-            <a:solidFill>
-              <a:srgbClr val="1D5366"/>
-            </a:solidFill>
-            <a:headEnd type="none" w="med" len="med"/>
-            <a:tailEnd type="arrow" w="med" len="med"/>
-          </a:ln>
-        </p:spPr>
-        <p:style>
-          <a:lnRef idx="1">
-            <a:schemeClr val="accent1"/>
-          </a:lnRef>
-          <a:fillRef idx="0">
-            <a:schemeClr val="accent1"/>
-          </a:fillRef>
-          <a:effectRef idx="0">
-            <a:schemeClr val="accent1"/>
-          </a:effectRef>
-          <a:fontRef idx="minor">
-            <a:schemeClr val="tx1"/>
-          </a:fontRef>
-        </p:style>
-      </p:cxnSp>
-      <p:cxnSp>
-        <p:nvCxnSpPr>
-          <p:cNvPr id="124" name="Curved Connector 74">
-            <a:extLst>
-              <a:ext uri="{FF2B5EF4-FFF2-40B4-BE49-F238E27FC236}">
-                <a16:creationId xmlns:a16="http://schemas.microsoft.com/office/drawing/2014/main" id="{F5828780-2330-CA3F-764B-8842750186EA}"/>
-              </a:ext>
-            </a:extLst>
-          </p:cNvPr>
-          <p:cNvCxnSpPr>
-            <a:cxnSpLocks/>
-          </p:cNvCxnSpPr>
-          <p:nvPr/>
-        </p:nvCxnSpPr>
-        <p:spPr>
-          <a:xfrm>
-            <a:off x="7185695" y="2839560"/>
-            <a:ext cx="1143609" cy="422093"/>
-          </a:xfrm>
-          <a:prstGeom prst="straightConnector1">
-            <a:avLst/>
-          </a:prstGeom>
-          <a:ln w="28575">
-            <a:solidFill>
-              <a:srgbClr val="1D5366"/>
-            </a:solidFill>
-            <a:headEnd type="none" w="med" len="med"/>
-            <a:tailEnd type="arrow" w="med" len="med"/>
-          </a:ln>
-        </p:spPr>
-        <p:style>
-          <a:lnRef idx="1">
-            <a:schemeClr val="accent1"/>
-          </a:lnRef>
-          <a:fillRef idx="0">
-            <a:schemeClr val="accent1"/>
-          </a:fillRef>
-          <a:effectRef idx="0">
-            <a:schemeClr val="accent1"/>
-          </a:effectRef>
-          <a:fontRef idx="minor">
-            <a:schemeClr val="tx1"/>
-          </a:fontRef>
-        </p:style>
-      </p:cxnSp>
-      <p:cxnSp>
-        <p:nvCxnSpPr>
-          <p:cNvPr id="132" name="Curved Connector 74">
-            <a:extLst>
-              <a:ext uri="{FF2B5EF4-FFF2-40B4-BE49-F238E27FC236}">
-                <a16:creationId xmlns:a16="http://schemas.microsoft.com/office/drawing/2014/main" id="{533C5403-7FD8-A7E5-15A2-5AE9F25B5655}"/>
-              </a:ext>
-            </a:extLst>
-          </p:cNvPr>
-          <p:cNvCxnSpPr>
-            <a:cxnSpLocks/>
-          </p:cNvCxnSpPr>
-          <p:nvPr/>
-        </p:nvCxnSpPr>
-        <p:spPr>
-          <a:xfrm rot="60000" flipV="1">
-            <a:off x="6971667" y="3820483"/>
-            <a:ext cx="1336454" cy="535532"/>
-          </a:xfrm>
-          <a:prstGeom prst="straightConnector1">
-            <a:avLst/>
-          </a:prstGeom>
-          <a:ln w="28575">
-            <a:solidFill>
-              <a:srgbClr val="1D5366"/>
-            </a:solidFill>
-            <a:headEnd type="none" w="med" len="med"/>
-            <a:tailEnd type="arrow" w="med" len="med"/>
-          </a:ln>
-        </p:spPr>
-        <p:style>
-          <a:lnRef idx="1">
-            <a:schemeClr val="accent1"/>
-          </a:lnRef>
-          <a:fillRef idx="0">
-            <a:schemeClr val="accent1"/>
-          </a:fillRef>
-          <a:effectRef idx="0">
-            <a:schemeClr val="accent1"/>
-          </a:effectRef>
-          <a:fontRef idx="minor">
-            <a:schemeClr val="tx1"/>
-          </a:fontRef>
-        </p:style>
-      </p:cxnSp>
-      <p:cxnSp>
-        <p:nvCxnSpPr>
-          <p:cNvPr id="135" name="Curved Connector 74">
-            <a:extLst>
-              <a:ext uri="{FF2B5EF4-FFF2-40B4-BE49-F238E27FC236}">
-                <a16:creationId xmlns:a16="http://schemas.microsoft.com/office/drawing/2014/main" id="{A998CBF1-CE30-D4EE-F37D-123C4E3D7244}"/>
-              </a:ext>
-            </a:extLst>
-          </p:cNvPr>
-          <p:cNvCxnSpPr>
-            <a:cxnSpLocks/>
-          </p:cNvCxnSpPr>
-          <p:nvPr/>
-        </p:nvCxnSpPr>
-        <p:spPr>
-          <a:xfrm flipH="1">
-            <a:off x="6926017" y="3674637"/>
-            <a:ext cx="1382104" cy="531267"/>
-          </a:xfrm>
-          <a:prstGeom prst="straightConnector1">
-            <a:avLst/>
-          </a:prstGeom>
-          <a:ln w="28575">
-            <a:solidFill>
-              <a:srgbClr val="1D5366"/>
-            </a:solidFill>
-            <a:headEnd type="none" w="med" len="med"/>
-            <a:tailEnd type="arrow" w="med" len="med"/>
-          </a:ln>
-        </p:spPr>
-        <p:style>
-          <a:lnRef idx="1">
-            <a:schemeClr val="accent1"/>
-          </a:lnRef>
-          <a:fillRef idx="0">
-            <a:schemeClr val="accent1"/>
-          </a:fillRef>
-          <a:effectRef idx="0">
-            <a:schemeClr val="accent1"/>
-          </a:effectRef>
-          <a:fontRef idx="minor">
-            <a:schemeClr val="tx1"/>
-          </a:fontRef>
-        </p:style>
-      </p:cxnSp>
-      <p:sp>
-        <p:nvSpPr>
-          <p:cNvPr id="140" name="TextBox 139">
-            <a:extLst>
-              <a:ext uri="{FF2B5EF4-FFF2-40B4-BE49-F238E27FC236}">
-                <a16:creationId xmlns:a16="http://schemas.microsoft.com/office/drawing/2014/main" id="{628C1883-AC34-0095-7BAB-D11DBD8150E9}"/>
-              </a:ext>
-            </a:extLst>
-          </p:cNvPr>
-          <p:cNvSpPr txBox="1"/>
-          <p:nvPr/>
-        </p:nvSpPr>
-        <p:spPr>
-          <a:xfrm rot="1200000">
-            <a:off x="7501295" y="2682189"/>
-            <a:ext cx="959247" cy="307777"/>
-          </a:xfrm>
-          <a:prstGeom prst="rect">
-            <a:avLst/>
-          </a:prstGeom>
-          <a:noFill/>
-        </p:spPr>
-        <p:txBody>
-          <a:bodyPr wrap="square" rtlCol="0">
-            <a:spAutoFit/>
-          </a:bodyPr>
-          <a:lstStyle/>
-          <a:p>
-            <a:r>
-              <a:rPr lang="en-US" sz="1400" dirty="0">
-                <a:solidFill>
-                  <a:srgbClr val="1D5366"/>
-                </a:solidFill>
-              </a:rPr>
-              <a:t>Query</a:t>
-            </a:r>
-          </a:p>
-        </p:txBody>
-      </p:sp>
-      <p:sp>
-        <p:nvSpPr>
-          <p:cNvPr id="141" name="TextBox 140">
-            <a:extLst>
-              <a:ext uri="{FF2B5EF4-FFF2-40B4-BE49-F238E27FC236}">
-                <a16:creationId xmlns:a16="http://schemas.microsoft.com/office/drawing/2014/main" id="{CE700373-768A-B5DA-4CBE-AB0C449C743A}"/>
-              </a:ext>
-            </a:extLst>
-          </p:cNvPr>
-          <p:cNvSpPr txBox="1"/>
-          <p:nvPr/>
-        </p:nvSpPr>
-        <p:spPr>
-          <a:xfrm rot="20340000">
-            <a:off x="7174393" y="3651411"/>
-            <a:ext cx="959247" cy="307777"/>
-          </a:xfrm>
-          <a:prstGeom prst="rect">
-            <a:avLst/>
-          </a:prstGeom>
-          <a:noFill/>
-        </p:spPr>
-        <p:txBody>
-          <a:bodyPr wrap="square" rtlCol="0">
-            <a:spAutoFit/>
-          </a:bodyPr>
-          <a:lstStyle/>
-          <a:p>
-            <a:r>
-              <a:rPr lang="en-US" sz="1400" dirty="0">
-                <a:solidFill>
-                  <a:srgbClr val="1D5366"/>
-                </a:solidFill>
-              </a:rPr>
-              <a:t>Get files</a:t>
-            </a:r>
-          </a:p>
-        </p:txBody>
-      </p:sp>
-      <p:sp>
-        <p:nvSpPr>
-          <p:cNvPr id="142" name="TextBox 141">
-            <a:extLst>
-              <a:ext uri="{FF2B5EF4-FFF2-40B4-BE49-F238E27FC236}">
-                <a16:creationId xmlns:a16="http://schemas.microsoft.com/office/drawing/2014/main" id="{7C4A4D55-BCCE-C0E1-4E87-67EE5F638BB4}"/>
-              </a:ext>
-            </a:extLst>
-          </p:cNvPr>
-          <p:cNvSpPr txBox="1"/>
-          <p:nvPr/>
-        </p:nvSpPr>
-        <p:spPr>
-          <a:xfrm rot="20340000">
-            <a:off x="7197248" y="4052015"/>
-            <a:ext cx="959247" cy="307777"/>
-          </a:xfrm>
-          <a:prstGeom prst="rect">
-            <a:avLst/>
-          </a:prstGeom>
-          <a:noFill/>
-        </p:spPr>
-        <p:txBody>
-          <a:bodyPr wrap="square" rtlCol="0">
-            <a:spAutoFit/>
-          </a:bodyPr>
-          <a:lstStyle/>
-          <a:p>
-            <a:r>
-              <a:rPr lang="en-US" sz="1400" dirty="0">
-                <a:solidFill>
-                  <a:srgbClr val="1D5366"/>
-                </a:solidFill>
-              </a:rPr>
-              <a:t>Nexus files</a:t>
-            </a:r>
-          </a:p>
-        </p:txBody>
-      </p:sp>
-      <p:sp>
-        <p:nvSpPr>
-          <p:cNvPr id="143" name="TextBox 142">
-            <a:extLst>
-              <a:ext uri="{FF2B5EF4-FFF2-40B4-BE49-F238E27FC236}">
-                <a16:creationId xmlns:a16="http://schemas.microsoft.com/office/drawing/2014/main" id="{AA5517B1-C1E1-078E-8CE5-C2D0561F5A00}"/>
-              </a:ext>
-            </a:extLst>
-          </p:cNvPr>
-          <p:cNvSpPr txBox="1"/>
-          <p:nvPr/>
-        </p:nvSpPr>
-        <p:spPr>
-          <a:xfrm rot="1200000">
-            <a:off x="7259127" y="3019564"/>
-            <a:ext cx="959247" cy="307777"/>
-          </a:xfrm>
-          <a:prstGeom prst="rect">
-            <a:avLst/>
-          </a:prstGeom>
-          <a:noFill/>
-        </p:spPr>
-        <p:txBody>
-          <a:bodyPr wrap="square" rtlCol="0">
-            <a:spAutoFit/>
-          </a:bodyPr>
-          <a:lstStyle/>
-          <a:p>
-            <a:r>
-              <a:rPr lang="en-US" sz="1400" dirty="0">
-                <a:solidFill>
-                  <a:srgbClr val="1D5366"/>
-                </a:solidFill>
-              </a:rPr>
-              <a:t>List of files</a:t>
-            </a:r>
-          </a:p>
-        </p:txBody>
-      </p:sp>
-      <p:cxnSp>
-        <p:nvCxnSpPr>
-          <p:cNvPr id="144" name="Curved Connector 74">
-            <a:extLst>
-              <a:ext uri="{FF2B5EF4-FFF2-40B4-BE49-F238E27FC236}">
-                <a16:creationId xmlns:a16="http://schemas.microsoft.com/office/drawing/2014/main" id="{13B5BFE1-B1AC-81D1-3F85-0E0FE46F2960}"/>
-              </a:ext>
-            </a:extLst>
-          </p:cNvPr>
-          <p:cNvCxnSpPr>
-            <a:cxnSpLocks/>
-          </p:cNvCxnSpPr>
-          <p:nvPr/>
-        </p:nvCxnSpPr>
-        <p:spPr>
-          <a:xfrm flipH="1" flipV="1">
-            <a:off x="9610941" y="3693618"/>
-            <a:ext cx="1159374" cy="422093"/>
-          </a:xfrm>
-          <a:prstGeom prst="straightConnector1">
-            <a:avLst/>
-          </a:prstGeom>
-          <a:ln w="28575">
-            <a:solidFill>
-              <a:srgbClr val="1D5366"/>
-            </a:solidFill>
-            <a:headEnd type="none" w="med" len="med"/>
-            <a:tailEnd type="arrow" w="med" len="med"/>
-          </a:ln>
-        </p:spPr>
-        <p:style>
-          <a:lnRef idx="1">
-            <a:schemeClr val="accent1"/>
-          </a:lnRef>
-          <a:fillRef idx="0">
-            <a:schemeClr val="accent1"/>
-          </a:fillRef>
-          <a:effectRef idx="0">
-            <a:schemeClr val="accent1"/>
-          </a:effectRef>
-          <a:fontRef idx="minor">
-            <a:schemeClr val="tx1"/>
-          </a:fontRef>
-        </p:style>
-      </p:cxnSp>
-      <p:cxnSp>
-        <p:nvCxnSpPr>
-          <p:cNvPr id="145" name="Curved Connector 74">
-            <a:extLst>
-              <a:ext uri="{FF2B5EF4-FFF2-40B4-BE49-F238E27FC236}">
-                <a16:creationId xmlns:a16="http://schemas.microsoft.com/office/drawing/2014/main" id="{B75C6A4D-91E2-B4FD-0AD0-C0F768D83F6D}"/>
-              </a:ext>
-            </a:extLst>
-          </p:cNvPr>
-          <p:cNvCxnSpPr>
-            <a:cxnSpLocks/>
-          </p:cNvCxnSpPr>
-          <p:nvPr/>
-        </p:nvCxnSpPr>
-        <p:spPr>
-          <a:xfrm>
-            <a:off x="9626706" y="3878972"/>
-            <a:ext cx="1143609" cy="422093"/>
-          </a:xfrm>
-          <a:prstGeom prst="straightConnector1">
-            <a:avLst/>
-          </a:prstGeom>
-          <a:ln w="28575">
-            <a:solidFill>
-              <a:srgbClr val="1D5366"/>
-            </a:solidFill>
-            <a:headEnd type="none" w="med" len="med"/>
-            <a:tailEnd type="arrow" w="med" len="med"/>
-          </a:ln>
-        </p:spPr>
-        <p:style>
-          <a:lnRef idx="1">
-            <a:schemeClr val="accent1"/>
-          </a:lnRef>
-          <a:fillRef idx="0">
-            <a:schemeClr val="accent1"/>
-          </a:fillRef>
-          <a:effectRef idx="0">
-            <a:schemeClr val="accent1"/>
-          </a:effectRef>
-          <a:fontRef idx="minor">
-            <a:schemeClr val="tx1"/>
-          </a:fontRef>
-        </p:style>
-      </p:cxnSp>
-      <p:sp>
-        <p:nvSpPr>
-          <p:cNvPr id="146" name="TextBox 145">
-            <a:extLst>
-              <a:ext uri="{FF2B5EF4-FFF2-40B4-BE49-F238E27FC236}">
-                <a16:creationId xmlns:a16="http://schemas.microsoft.com/office/drawing/2014/main" id="{44E76C47-2F72-5059-0775-2B8E7E3CCFC7}"/>
-              </a:ext>
-            </a:extLst>
-          </p:cNvPr>
-          <p:cNvSpPr txBox="1"/>
-          <p:nvPr/>
-        </p:nvSpPr>
-        <p:spPr>
-          <a:xfrm rot="1200000">
-            <a:off x="9942306" y="3721601"/>
-            <a:ext cx="959247" cy="307777"/>
-          </a:xfrm>
-          <a:prstGeom prst="rect">
-            <a:avLst/>
-          </a:prstGeom>
-          <a:noFill/>
-        </p:spPr>
-        <p:txBody>
-          <a:bodyPr wrap="square" rtlCol="0">
-            <a:spAutoFit/>
-          </a:bodyPr>
-          <a:lstStyle/>
-          <a:p>
-            <a:r>
-              <a:rPr lang="en-US" sz="1400" dirty="0">
-                <a:solidFill>
-                  <a:srgbClr val="1D5366"/>
-                </a:solidFill>
-              </a:rPr>
-              <a:t>Request</a:t>
-            </a:r>
-          </a:p>
-        </p:txBody>
-      </p:sp>
-      <p:sp>
-        <p:nvSpPr>
-          <p:cNvPr id="147" name="TextBox 146">
-            <a:extLst>
-              <a:ext uri="{FF2B5EF4-FFF2-40B4-BE49-F238E27FC236}">
-                <a16:creationId xmlns:a16="http://schemas.microsoft.com/office/drawing/2014/main" id="{4B5C3625-700A-6E87-D265-89C65136AD21}"/>
-              </a:ext>
-            </a:extLst>
-          </p:cNvPr>
-          <p:cNvSpPr txBox="1"/>
-          <p:nvPr/>
-        </p:nvSpPr>
-        <p:spPr>
-          <a:xfrm rot="1200000">
-            <a:off x="9700138" y="4058976"/>
-            <a:ext cx="959247" cy="307777"/>
-          </a:xfrm>
-          <a:prstGeom prst="rect">
-            <a:avLst/>
-          </a:prstGeom>
-          <a:noFill/>
-        </p:spPr>
-        <p:txBody>
-          <a:bodyPr wrap="square" rtlCol="0">
-            <a:spAutoFit/>
-          </a:bodyPr>
-          <a:lstStyle/>
-          <a:p>
-            <a:r>
-              <a:rPr lang="en-US" sz="1400" dirty="0">
-                <a:solidFill>
-                  <a:srgbClr val="1D5366"/>
-                </a:solidFill>
-              </a:rPr>
-              <a:t>Nexus files</a:t>
-            </a:r>
-          </a:p>
-        </p:txBody>
-      </p:sp>
-      <p:cxnSp>
-        <p:nvCxnSpPr>
-          <p:cNvPr id="148" name="Curved Connector 74">
-            <a:extLst>
-              <a:ext uri="{FF2B5EF4-FFF2-40B4-BE49-F238E27FC236}">
-                <a16:creationId xmlns:a16="http://schemas.microsoft.com/office/drawing/2014/main" id="{CB2C551F-5EE8-73CD-FBCA-2250DD133F00}"/>
-              </a:ext>
-            </a:extLst>
-          </p:cNvPr>
-          <p:cNvCxnSpPr>
-            <a:cxnSpLocks/>
-          </p:cNvCxnSpPr>
-          <p:nvPr/>
-        </p:nvCxnSpPr>
-        <p:spPr>
-          <a:xfrm flipH="1">
-            <a:off x="9591446" y="2805511"/>
-            <a:ext cx="1159374" cy="422093"/>
-          </a:xfrm>
-          <a:prstGeom prst="straightConnector1">
-            <a:avLst/>
-          </a:prstGeom>
-          <a:ln w="28575">
-            <a:solidFill>
-              <a:srgbClr val="1D5366"/>
-            </a:solidFill>
-            <a:headEnd type="none" w="med" len="med"/>
-            <a:tailEnd type="arrow" w="med" len="med"/>
-          </a:ln>
-        </p:spPr>
-        <p:style>
-          <a:lnRef idx="1">
-            <a:schemeClr val="accent1"/>
-          </a:lnRef>
-          <a:fillRef idx="0">
-            <a:schemeClr val="accent1"/>
-          </a:fillRef>
-          <a:effectRef idx="0">
-            <a:schemeClr val="accent1"/>
-          </a:effectRef>
-          <a:fontRef idx="minor">
-            <a:schemeClr val="tx1"/>
-          </a:fontRef>
-        </p:style>
-      </p:cxnSp>
-      <p:cxnSp>
-        <p:nvCxnSpPr>
-          <p:cNvPr id="149" name="Curved Connector 74">
-            <a:extLst>
-              <a:ext uri="{FF2B5EF4-FFF2-40B4-BE49-F238E27FC236}">
-                <a16:creationId xmlns:a16="http://schemas.microsoft.com/office/drawing/2014/main" id="{58F55322-977C-AF1F-FD63-BD33BABF406C}"/>
-              </a:ext>
-            </a:extLst>
-          </p:cNvPr>
-          <p:cNvCxnSpPr>
-            <a:cxnSpLocks/>
-          </p:cNvCxnSpPr>
-          <p:nvPr/>
-        </p:nvCxnSpPr>
-        <p:spPr>
-          <a:xfrm flipV="1">
-            <a:off x="9607211" y="2990865"/>
-            <a:ext cx="1143609" cy="422093"/>
-          </a:xfrm>
-          <a:prstGeom prst="straightConnector1">
-            <a:avLst/>
-          </a:prstGeom>
-          <a:ln w="28575">
-            <a:solidFill>
-              <a:srgbClr val="1D5366"/>
-            </a:solidFill>
-            <a:headEnd type="none" w="med" len="med"/>
-            <a:tailEnd type="arrow" w="med" len="med"/>
-          </a:ln>
-        </p:spPr>
-        <p:style>
-          <a:lnRef idx="1">
-            <a:schemeClr val="accent1"/>
-          </a:lnRef>
-          <a:fillRef idx="0">
-            <a:schemeClr val="accent1"/>
-          </a:fillRef>
-          <a:effectRef idx="0">
-            <a:schemeClr val="accent1"/>
-          </a:effectRef>
-          <a:fontRef idx="minor">
-            <a:schemeClr val="tx1"/>
-          </a:fontRef>
-        </p:style>
-      </p:cxnSp>
-      <p:sp>
-        <p:nvSpPr>
-          <p:cNvPr id="150" name="TextBox 149">
-            <a:extLst>
-              <a:ext uri="{FF2B5EF4-FFF2-40B4-BE49-F238E27FC236}">
-                <a16:creationId xmlns:a16="http://schemas.microsoft.com/office/drawing/2014/main" id="{FF717312-16B8-A8F1-6793-0965812CCBE9}"/>
-              </a:ext>
-            </a:extLst>
-          </p:cNvPr>
-          <p:cNvSpPr txBox="1"/>
-          <p:nvPr/>
-        </p:nvSpPr>
-        <p:spPr>
-          <a:xfrm rot="9600000" flipV="1">
-            <a:off x="9886046" y="2671878"/>
-            <a:ext cx="959247" cy="307777"/>
-          </a:xfrm>
-          <a:prstGeom prst="rect">
-            <a:avLst/>
-          </a:prstGeom>
-          <a:noFill/>
-        </p:spPr>
-        <p:txBody>
-          <a:bodyPr wrap="square" rtlCol="0">
-            <a:spAutoFit/>
-          </a:bodyPr>
-          <a:lstStyle/>
-          <a:p>
-            <a:r>
-              <a:rPr lang="en-US" sz="1400" dirty="0">
-                <a:solidFill>
-                  <a:srgbClr val="1D5366"/>
-                </a:solidFill>
-              </a:rPr>
-              <a:t>Request</a:t>
-            </a:r>
-          </a:p>
-        </p:txBody>
-      </p:sp>
-      <p:sp>
-        <p:nvSpPr>
-          <p:cNvPr id="151" name="TextBox 150">
-            <a:extLst>
-              <a:ext uri="{FF2B5EF4-FFF2-40B4-BE49-F238E27FC236}">
-                <a16:creationId xmlns:a16="http://schemas.microsoft.com/office/drawing/2014/main" id="{60372704-4EF6-EE75-27F1-FD716B58DB9C}"/>
-              </a:ext>
-            </a:extLst>
-          </p:cNvPr>
-          <p:cNvSpPr txBox="1"/>
-          <p:nvPr/>
-        </p:nvSpPr>
-        <p:spPr>
-          <a:xfrm rot="9600000" flipV="1">
-            <a:off x="9680643" y="3170869"/>
-            <a:ext cx="959247" cy="307777"/>
-          </a:xfrm>
-          <a:prstGeom prst="rect">
-            <a:avLst/>
-          </a:prstGeom>
-          <a:noFill/>
-        </p:spPr>
-        <p:txBody>
-          <a:bodyPr wrap="square" rtlCol="0">
-            <a:spAutoFit/>
-          </a:bodyPr>
-          <a:lstStyle/>
-          <a:p>
-            <a:r>
-              <a:rPr lang="en-US" sz="1400" dirty="0">
-                <a:solidFill>
-                  <a:srgbClr val="1D5366"/>
-                </a:solidFill>
-              </a:rPr>
-              <a:t>Nexus files</a:t>
-            </a:r>
-          </a:p>
-        </p:txBody>
-      </p:sp>
     </p:spTree>
     <p:extLst>
       <p:ext uri="{BB962C8B-B14F-4D97-AF65-F5344CB8AC3E}">

</xml_diff>